<commit_message>
Lab 3/2/20 slides: made a few edits
</commit_message>
<xml_diff>
--- a/cs401_3_2_20.pptx
+++ b/cs401_3_2_20.pptx
@@ -5,22 +5,20 @@
     <p:sldMasterId id="2147483660" r:id="rId1"/>
   </p:sldMasterIdLst>
   <p:notesMasterIdLst>
-    <p:notesMasterId r:id="rId15"/>
+    <p:notesMasterId r:id="rId13"/>
   </p:notesMasterIdLst>
   <p:sldIdLst>
     <p:sldId id="256" r:id="rId2"/>
     <p:sldId id="257" r:id="rId3"/>
     <p:sldId id="258" r:id="rId4"/>
-    <p:sldId id="259" r:id="rId5"/>
-    <p:sldId id="260" r:id="rId6"/>
-    <p:sldId id="261" r:id="rId7"/>
-    <p:sldId id="262" r:id="rId8"/>
-    <p:sldId id="263" r:id="rId9"/>
-    <p:sldId id="264" r:id="rId10"/>
-    <p:sldId id="265" r:id="rId11"/>
-    <p:sldId id="266" r:id="rId12"/>
-    <p:sldId id="267" r:id="rId13"/>
-    <p:sldId id="268" r:id="rId14"/>
+    <p:sldId id="261" r:id="rId5"/>
+    <p:sldId id="262" r:id="rId6"/>
+    <p:sldId id="263" r:id="rId7"/>
+    <p:sldId id="264" r:id="rId8"/>
+    <p:sldId id="265" r:id="rId9"/>
+    <p:sldId id="266" r:id="rId10"/>
+    <p:sldId id="267" r:id="rId11"/>
+    <p:sldId id="268" r:id="rId12"/>
   </p:sldIdLst>
   <p:sldSz cx="9144000" cy="6858000" type="screen4x3"/>
   <p:notesSz cx="6858000" cy="9144000"/>
@@ -3363,7 +3361,7 @@
           <p:cNvPr id="4" name="TextBox 3">
             <a:extLst>
               <a:ext uri="{FF2B5EF4-FFF2-40B4-BE49-F238E27FC236}">
-                <a16:creationId xmlns:a16="http://schemas.microsoft.com/office/drawing/2014/main" id="{8A67A37A-C488-40D7-A088-6774405888BB}"/>
+                <a16:creationId xmlns:a16="http://schemas.microsoft.com/office/drawing/2014/main" xmlns="" id="{8A67A37A-C488-40D7-A088-6774405888BB}"/>
               </a:ext>
             </a:extLst>
           </p:cNvPr>
@@ -3401,7 +3399,7 @@
           <p:cNvPr id="5" name="TextBox 4">
             <a:extLst>
               <a:ext uri="{FF2B5EF4-FFF2-40B4-BE49-F238E27FC236}">
-                <a16:creationId xmlns:a16="http://schemas.microsoft.com/office/drawing/2014/main" id="{EC931DCA-4690-4B93-9419-BA902293A61A}"/>
+                <a16:creationId xmlns:a16="http://schemas.microsoft.com/office/drawing/2014/main" xmlns="" id="{EC931DCA-4690-4B93-9419-BA902293A61A}"/>
               </a:ext>
             </a:extLst>
           </p:cNvPr>
@@ -3524,6 +3522,13 @@
   <p:clrMapOvr>
     <a:masterClrMapping/>
   </p:clrMapOvr>
+  <p:timing>
+    <p:tnLst>
+      <p:par>
+        <p:cTn id="1" dur="indefinite" restart="never" nodeType="tmRoot"/>
+      </p:par>
+    </p:tnLst>
+  </p:timing>
 </p:sld>
 </file>
 
@@ -3549,310 +3554,7 @@
           <p:cNvPr id="2" name="TextBox 1">
             <a:extLst>
               <a:ext uri="{FF2B5EF4-FFF2-40B4-BE49-F238E27FC236}">
-                <a16:creationId xmlns:a16="http://schemas.microsoft.com/office/drawing/2014/main" id="{8A67A37A-C488-40D7-A088-6774405888BB}"/>
-              </a:ext>
-            </a:extLst>
-          </p:cNvPr>
-          <p:cNvSpPr txBox="1"/>
-          <p:nvPr/>
-        </p:nvSpPr>
-        <p:spPr>
-          <a:xfrm>
-            <a:off x="0" y="0"/>
-            <a:ext cx="8134066" cy="461665"/>
-          </a:xfrm>
-          <a:prstGeom prst="rect">
-            <a:avLst/>
-          </a:prstGeom>
-        </p:spPr>
-        <p:txBody>
-          <a:bodyPr rtlCol="0">
-            <a:spAutoFit/>
-          </a:bodyPr>
-          <a:lstStyle/>
-          <a:p>
-            <a:r>
-              <a:rPr lang="en-US" sz="2400" dirty="0">
-                <a:solidFill>
-                  <a:srgbClr val="002060"/>
-                </a:solidFill>
-              </a:rPr>
-              <a:t>The </a:t>
-            </a:r>
-            <a:r>
-              <a:rPr lang="en-US" sz="2400" dirty="0" err="1">
-                <a:solidFill>
-                  <a:srgbClr val="002060"/>
-                </a:solidFill>
-              </a:rPr>
-              <a:t>TVShow</a:t>
-            </a:r>
-            <a:r>
-              <a:rPr lang="en-US" sz="2400" dirty="0">
-                <a:solidFill>
-                  <a:srgbClr val="002060"/>
-                </a:solidFill>
-              </a:rPr>
-              <a:t> class (</a:t>
-            </a:r>
-            <a:r>
-              <a:rPr lang="en-US" sz="2400" dirty="0" err="1">
-                <a:solidFill>
-                  <a:srgbClr val="002060"/>
-                </a:solidFill>
-              </a:rPr>
-              <a:t>pg</a:t>
-            </a:r>
-            <a:r>
-              <a:rPr lang="en-US" sz="2400" dirty="0">
-                <a:solidFill>
-                  <a:srgbClr val="002060"/>
-                </a:solidFill>
-              </a:rPr>
-              <a:t> 5):</a:t>
-            </a:r>
-          </a:p>
-        </p:txBody>
-      </p:sp>
-      <p:sp>
-        <p:nvSpPr>
-          <p:cNvPr id="3" name="TextBox 2">
-            <a:extLst>
-              <a:ext uri="{FF2B5EF4-FFF2-40B4-BE49-F238E27FC236}">
-                <a16:creationId xmlns:a16="http://schemas.microsoft.com/office/drawing/2014/main" id="{EC931DCA-4690-4B93-9419-BA902293A61A}"/>
-              </a:ext>
-            </a:extLst>
-          </p:cNvPr>
-          <p:cNvSpPr txBox="1"/>
-          <p:nvPr/>
-        </p:nvSpPr>
-        <p:spPr>
-          <a:xfrm>
-            <a:off x="-183806" y="568895"/>
-            <a:ext cx="8943940" cy="5170646"/>
-          </a:xfrm>
-          <a:prstGeom prst="rect">
-            <a:avLst/>
-          </a:prstGeom>
-        </p:spPr>
-        <p:txBody>
-          <a:bodyPr wrap="square" rtlCol="0">
-            <a:spAutoFit/>
-          </a:bodyPr>
-          <a:lstStyle/>
-          <a:p>
-            <a:pPr marL="914400" lvl="1" indent="-457200">
-              <a:buFont typeface="+mj-lt"/>
-              <a:buAutoNum type="arabicPeriod" startAt="3"/>
-            </a:pPr>
-            <a:r>
-              <a:rPr lang="en-US" sz="2200" dirty="0"/>
-              <a:t>One constructor: </a:t>
-            </a:r>
-          </a:p>
-          <a:p>
-            <a:pPr marL="1371600" lvl="2" indent="-457200">
-              <a:buFont typeface="Arial" panose="020B0604020202020204" pitchFamily="34" charset="0"/>
-              <a:buChar char="•"/>
-            </a:pPr>
-            <a:r>
-              <a:rPr lang="en-US" sz="2200" dirty="0"/>
-              <a:t>Argument: </a:t>
-            </a:r>
-            <a:r>
-              <a:rPr lang="en-US" sz="2200" dirty="0" err="1"/>
-              <a:t>filepath</a:t>
-            </a:r>
-            <a:r>
-              <a:rPr lang="en-US" sz="2200" dirty="0"/>
-              <a:t> of text file containing info about a TV Show (see appendices D and E).</a:t>
-            </a:r>
-          </a:p>
-          <a:p>
-            <a:pPr marL="1371600" lvl="2" indent="-457200">
-              <a:buFont typeface="Arial" panose="020B0604020202020204" pitchFamily="34" charset="0"/>
-              <a:buChar char="•"/>
-            </a:pPr>
-            <a:r>
-              <a:rPr lang="en-US" sz="2200" dirty="0"/>
-              <a:t>The constructor will read in the file, which will contain info needed to fill in the class fields (those specific to </a:t>
-            </a:r>
-            <a:r>
-              <a:rPr lang="en-US" sz="2200" dirty="0" err="1"/>
-              <a:t>TVShow</a:t>
-            </a:r>
-            <a:r>
-              <a:rPr lang="en-US" sz="2200" dirty="0"/>
-              <a:t>, and those inherited from the </a:t>
-            </a:r>
-            <a:r>
-              <a:rPr lang="en-US" sz="2200" dirty="0" err="1"/>
-              <a:t>StreamingVideo</a:t>
-            </a:r>
-            <a:r>
-              <a:rPr lang="en-US" sz="2200" dirty="0"/>
-              <a:t> superclass).</a:t>
-            </a:r>
-          </a:p>
-          <a:p>
-            <a:pPr marL="1828800" lvl="3" indent="-457200">
-              <a:buFont typeface="Arial" panose="020B0604020202020204" pitchFamily="34" charset="0"/>
-              <a:buChar char="•"/>
-            </a:pPr>
-            <a:r>
-              <a:rPr lang="en-US" sz="2200" dirty="0">
-                <a:solidFill>
-                  <a:schemeClr val="bg1">
-                    <a:lumMod val="50000"/>
-                  </a:schemeClr>
-                </a:solidFill>
-              </a:rPr>
-              <a:t>This is a little more complex of a process then is involved for the Movie class (see later slides).</a:t>
-            </a:r>
-          </a:p>
-          <a:p>
-            <a:pPr marL="1828800" lvl="3" indent="-457200">
-              <a:buFont typeface="Arial" panose="020B0604020202020204" pitchFamily="34" charset="0"/>
-              <a:buChar char="•"/>
-            </a:pPr>
-            <a:endParaRPr lang="en-US" sz="2200" dirty="0">
-              <a:solidFill>
-                <a:schemeClr val="bg1">
-                  <a:lumMod val="50000"/>
-                </a:schemeClr>
-              </a:solidFill>
-            </a:endParaRPr>
-          </a:p>
-          <a:p>
-            <a:pPr marL="914400" lvl="1" indent="-457200">
-              <a:buFont typeface="+mj-lt"/>
-              <a:buAutoNum type="arabicPeriod" startAt="3"/>
-            </a:pPr>
-            <a:r>
-              <a:rPr lang="en-US" sz="2200" dirty="0"/>
-              <a:t>A </a:t>
-            </a:r>
-            <a:r>
-              <a:rPr lang="en-US" sz="2200" dirty="0" err="1"/>
-              <a:t>toString</a:t>
-            </a:r>
-            <a:r>
-              <a:rPr lang="en-US" sz="2200" dirty="0"/>
-              <a:t>() method: Will use StringBuilder to create a string that will be later used by </a:t>
-            </a:r>
-            <a:r>
-              <a:rPr lang="en-US" sz="2200" dirty="0" err="1"/>
-              <a:t>JOptionPane</a:t>
-            </a:r>
-            <a:r>
-              <a:rPr lang="en-US" sz="2200" dirty="0"/>
-              <a:t>:</a:t>
-            </a:r>
-          </a:p>
-          <a:p>
-            <a:pPr marL="457200" indent="-457200">
-              <a:buFont typeface="+mj-lt"/>
-              <a:buAutoNum type="arabicPeriod" startAt="4"/>
-            </a:pPr>
-            <a:endParaRPr lang="en-US" sz="2200" dirty="0">
-              <a:solidFill>
-                <a:schemeClr val="bg1">
-                  <a:lumMod val="50000"/>
-                </a:schemeClr>
-              </a:solidFill>
-            </a:endParaRPr>
-          </a:p>
-          <a:p>
-            <a:pPr marL="1828800" lvl="3" indent="-457200">
-              <a:buFont typeface="Arial" panose="020B0604020202020204" pitchFamily="34" charset="0"/>
-              <a:buChar char="•"/>
-            </a:pPr>
-            <a:endParaRPr lang="en-US" sz="2200" dirty="0">
-              <a:solidFill>
-                <a:schemeClr val="bg1">
-                  <a:lumMod val="50000"/>
-                </a:schemeClr>
-              </a:solidFill>
-            </a:endParaRPr>
-          </a:p>
-          <a:p>
-            <a:pPr lvl="3"/>
-            <a:endParaRPr lang="en-US" sz="2200" dirty="0"/>
-          </a:p>
-          <a:p>
-            <a:pPr marL="914400" lvl="1" indent="-457200">
-              <a:buFont typeface="+mj-lt"/>
-              <a:buAutoNum type="arabicPeriod" startAt="3"/>
-            </a:pPr>
-            <a:endParaRPr lang="en-US" sz="2200" dirty="0"/>
-          </a:p>
-        </p:txBody>
-      </p:sp>
-      <p:pic>
-        <p:nvPicPr>
-          <p:cNvPr id="4" name="Picture 3">
-            <a:extLst>
-              <a:ext uri="{FF2B5EF4-FFF2-40B4-BE49-F238E27FC236}">
-                <a16:creationId xmlns:a16="http://schemas.microsoft.com/office/drawing/2014/main" id="{FB6161B1-A1BF-4B0B-9311-229788109A6B}"/>
-              </a:ext>
-            </a:extLst>
-          </p:cNvPr>
-          <p:cNvPicPr>
-            <a:picLocks noChangeAspect="1"/>
-          </p:cNvPicPr>
-          <p:nvPr/>
-        </p:nvPicPr>
-        <p:blipFill rotWithShape="1">
-          <a:blip r:embed="rId2"/>
-          <a:srcRect l="-193" r="46839" b="41756"/>
-          <a:stretch/>
-        </p:blipFill>
-        <p:spPr>
-          <a:xfrm>
-            <a:off x="5502607" y="3980299"/>
-            <a:ext cx="2743200" cy="2662955"/>
-          </a:xfrm>
-          <a:prstGeom prst="rect">
-            <a:avLst/>
-          </a:prstGeom>
-        </p:spPr>
-      </p:pic>
-    </p:spTree>
-    <p:extLst>
-      <p:ext uri="{BB962C8B-B14F-4D97-AF65-F5344CB8AC3E}">
-        <p14:creationId xmlns:p14="http://schemas.microsoft.com/office/powerpoint/2010/main" val="1388917208"/>
-      </p:ext>
-    </p:extLst>
-  </p:cSld>
-  <p:clrMapOvr>
-    <a:masterClrMapping/>
-  </p:clrMapOvr>
-</p:sld>
-</file>
-
-<file path=ppt/slides/slide11.xml><?xml version="1.0" encoding="utf-8"?>
-<p:sld xmlns:a="http://schemas.openxmlformats.org/drawingml/2006/main" xmlns:r="http://schemas.openxmlformats.org/officeDocument/2006/relationships" xmlns:p="http://schemas.openxmlformats.org/presentationml/2006/main">
-  <p:cSld>
-    <p:spTree>
-      <p:nvGrpSpPr>
-        <p:cNvPr id="1" name=""/>
-        <p:cNvGrpSpPr/>
-        <p:nvPr/>
-      </p:nvGrpSpPr>
-      <p:grpSpPr>
-        <a:xfrm>
-          <a:off x="0" y="0"/>
-          <a:ext cx="0" cy="0"/>
-          <a:chOff x="0" y="0"/>
-          <a:chExt cx="0" cy="0"/>
-        </a:xfrm>
-      </p:grpSpPr>
-      <p:sp>
-        <p:nvSpPr>
-          <p:cNvPr id="2" name="TextBox 1">
-            <a:extLst>
-              <a:ext uri="{FF2B5EF4-FFF2-40B4-BE49-F238E27FC236}">
-                <a16:creationId xmlns:a16="http://schemas.microsoft.com/office/drawing/2014/main" id="{8A67A37A-C488-40D7-A088-6774405888BB}"/>
+                <a16:creationId xmlns:a16="http://schemas.microsoft.com/office/drawing/2014/main" xmlns="" id="{8A67A37A-C488-40D7-A088-6774405888BB}"/>
               </a:ext>
             </a:extLst>
           </p:cNvPr>
@@ -3880,23 +3582,7 @@
                   <a:srgbClr val="002060"/>
                 </a:solidFill>
               </a:rPr>
-              <a:t>The </a:t>
-            </a:r>
-            <a:r>
-              <a:rPr lang="en-US" sz="2400" dirty="0" err="1">
-                <a:solidFill>
-                  <a:srgbClr val="002060"/>
-                </a:solidFill>
-              </a:rPr>
-              <a:t>TVShow</a:t>
-            </a:r>
-            <a:r>
-              <a:rPr lang="en-US" sz="2400" dirty="0">
-                <a:solidFill>
-                  <a:srgbClr val="002060"/>
-                </a:solidFill>
-              </a:rPr>
-              <a:t> class: top part of example file for a tv show (The Office)</a:t>
+              <a:t>The Season Class (example Season for The Office shown below)</a:t>
             </a:r>
           </a:p>
         </p:txBody>
@@ -3906,179 +3592,7 @@
           <p:cNvPr id="9" name="Picture 8" descr="A screenshot of a computer&#10;&#10;Description automatically generated">
             <a:extLst>
               <a:ext uri="{FF2B5EF4-FFF2-40B4-BE49-F238E27FC236}">
-                <a16:creationId xmlns:a16="http://schemas.microsoft.com/office/drawing/2014/main" id="{08CDB5DC-F80B-4A62-89F1-F8F0A78F5A04}"/>
-              </a:ext>
-            </a:extLst>
-          </p:cNvPr>
-          <p:cNvPicPr>
-            <a:picLocks noChangeAspect="1"/>
-          </p:cNvPicPr>
-          <p:nvPr/>
-        </p:nvPicPr>
-        <p:blipFill rotWithShape="1">
-          <a:blip r:embed="rId2">
-            <a:extLst>
-              <a:ext uri="{28A0092B-C50C-407E-A947-70E740481C1C}">
-                <a14:useLocalDpi xmlns:a14="http://schemas.microsoft.com/office/drawing/2010/main" val="0"/>
-              </a:ext>
-            </a:extLst>
-          </a:blip>
-          <a:srcRect l="848" t="10954" r="4158" b="4732"/>
-          <a:stretch/>
-        </p:blipFill>
-        <p:spPr>
-          <a:xfrm>
-            <a:off x="78059" y="557560"/>
-            <a:ext cx="8642195" cy="5742879"/>
-          </a:xfrm>
-          <a:prstGeom prst="rect">
-            <a:avLst/>
-          </a:prstGeom>
-        </p:spPr>
-      </p:pic>
-      <p:cxnSp>
-        <p:nvCxnSpPr>
-          <p:cNvPr id="11" name="Straight Arrow Connector 10">
-            <a:extLst>
-              <a:ext uri="{FF2B5EF4-FFF2-40B4-BE49-F238E27FC236}">
-                <a16:creationId xmlns:a16="http://schemas.microsoft.com/office/drawing/2014/main" id="{EA3164FF-5AE1-4959-AB1F-478616A5CDD0}"/>
-              </a:ext>
-            </a:extLst>
-          </p:cNvPr>
-          <p:cNvCxnSpPr/>
-          <p:nvPr/>
-        </p:nvCxnSpPr>
-        <p:spPr>
-          <a:xfrm flipH="1">
-            <a:off x="2085277" y="1694987"/>
-            <a:ext cx="713678" cy="0"/>
-          </a:xfrm>
-          <a:prstGeom prst="straightConnector1">
-            <a:avLst/>
-          </a:prstGeom>
-          <a:ln w="38100">
-            <a:tailEnd type="triangle"/>
-          </a:ln>
-        </p:spPr>
-        <p:style>
-          <a:lnRef idx="1">
-            <a:schemeClr val="accent6"/>
-          </a:lnRef>
-          <a:fillRef idx="0">
-            <a:schemeClr val="accent6"/>
-          </a:fillRef>
-          <a:effectRef idx="0">
-            <a:schemeClr val="accent6"/>
-          </a:effectRef>
-          <a:fontRef idx="minor">
-            <a:schemeClr val="tx1"/>
-          </a:fontRef>
-        </p:style>
-      </p:cxnSp>
-      <p:pic>
-        <p:nvPicPr>
-          <p:cNvPr id="13" name="Picture 12">
-            <a:extLst>
-              <a:ext uri="{FF2B5EF4-FFF2-40B4-BE49-F238E27FC236}">
-                <a16:creationId xmlns:a16="http://schemas.microsoft.com/office/drawing/2014/main" id="{FBCF706F-0430-4BFB-BC8A-5620757460CF}"/>
-              </a:ext>
-            </a:extLst>
-          </p:cNvPr>
-          <p:cNvPicPr>
-            <a:picLocks noChangeAspect="1"/>
-          </p:cNvPicPr>
-          <p:nvPr/>
-        </p:nvPicPr>
-        <p:blipFill>
-          <a:blip r:embed="rId3"/>
-          <a:stretch>
-            <a:fillRect/>
-          </a:stretch>
-        </p:blipFill>
-        <p:spPr>
-          <a:xfrm>
-            <a:off x="2798955" y="1790883"/>
-            <a:ext cx="5852160" cy="1676645"/>
-          </a:xfrm>
-          <a:prstGeom prst="rect">
-            <a:avLst/>
-          </a:prstGeom>
-        </p:spPr>
-      </p:pic>
-    </p:spTree>
-    <p:extLst>
-      <p:ext uri="{BB962C8B-B14F-4D97-AF65-F5344CB8AC3E}">
-        <p14:creationId xmlns:p14="http://schemas.microsoft.com/office/powerpoint/2010/main" val="1694514687"/>
-      </p:ext>
-    </p:extLst>
-  </p:cSld>
-  <p:clrMapOvr>
-    <a:masterClrMapping/>
-  </p:clrMapOvr>
-</p:sld>
-</file>
-
-<file path=ppt/slides/slide12.xml><?xml version="1.0" encoding="utf-8"?>
-<p:sld xmlns:a="http://schemas.openxmlformats.org/drawingml/2006/main" xmlns:r="http://schemas.openxmlformats.org/officeDocument/2006/relationships" xmlns:p="http://schemas.openxmlformats.org/presentationml/2006/main">
-  <p:cSld>
-    <p:spTree>
-      <p:nvGrpSpPr>
-        <p:cNvPr id="1" name=""/>
-        <p:cNvGrpSpPr/>
-        <p:nvPr/>
-      </p:nvGrpSpPr>
-      <p:grpSpPr>
-        <a:xfrm>
-          <a:off x="0" y="0"/>
-          <a:ext cx="0" cy="0"/>
-          <a:chOff x="0" y="0"/>
-          <a:chExt cx="0" cy="0"/>
-        </a:xfrm>
-      </p:grpSpPr>
-      <p:sp>
-        <p:nvSpPr>
-          <p:cNvPr id="2" name="TextBox 1">
-            <a:extLst>
-              <a:ext uri="{FF2B5EF4-FFF2-40B4-BE49-F238E27FC236}">
-                <a16:creationId xmlns:a16="http://schemas.microsoft.com/office/drawing/2014/main" id="{8A67A37A-C488-40D7-A088-6774405888BB}"/>
-              </a:ext>
-            </a:extLst>
-          </p:cNvPr>
-          <p:cNvSpPr txBox="1"/>
-          <p:nvPr/>
-        </p:nvSpPr>
-        <p:spPr>
-          <a:xfrm>
-            <a:off x="0" y="0"/>
-            <a:ext cx="8720254" cy="461665"/>
-          </a:xfrm>
-          <a:prstGeom prst="rect">
-            <a:avLst/>
-          </a:prstGeom>
-        </p:spPr>
-        <p:txBody>
-          <a:bodyPr wrap="square" rtlCol="0">
-            <a:spAutoFit/>
-          </a:bodyPr>
-          <a:lstStyle/>
-          <a:p>
-            <a:r>
-              <a:rPr lang="en-US" sz="2400" dirty="0">
-                <a:solidFill>
-                  <a:srgbClr val="002060"/>
-                </a:solidFill>
-              </a:rPr>
-              <a:t>The Season Class (example Season for The Office shown below)</a:t>
-            </a:r>
-          </a:p>
-        </p:txBody>
-      </p:sp>
-      <p:pic>
-        <p:nvPicPr>
-          <p:cNvPr id="9" name="Picture 8" descr="A screenshot of a computer&#10;&#10;Description automatically generated">
-            <a:extLst>
-              <a:ext uri="{FF2B5EF4-FFF2-40B4-BE49-F238E27FC236}">
-                <a16:creationId xmlns:a16="http://schemas.microsoft.com/office/drawing/2014/main" id="{08CDB5DC-F80B-4A62-89F1-F8F0A78F5A04}"/>
+                <a16:creationId xmlns:a16="http://schemas.microsoft.com/office/drawing/2014/main" xmlns="" id="{08CDB5DC-F80B-4A62-89F1-F8F0A78F5A04}"/>
               </a:ext>
             </a:extLst>
           </p:cNvPr>
@@ -4113,7 +3627,7 @@
           <p:cNvPr id="3" name="Picture 2">
             <a:extLst>
               <a:ext uri="{FF2B5EF4-FFF2-40B4-BE49-F238E27FC236}">
-                <a16:creationId xmlns:a16="http://schemas.microsoft.com/office/drawing/2014/main" id="{B6315D61-542E-4E7C-8E9B-D67BEE25534B}"/>
+                <a16:creationId xmlns:a16="http://schemas.microsoft.com/office/drawing/2014/main" xmlns="" id="{B6315D61-542E-4E7C-8E9B-D67BEE25534B}"/>
               </a:ext>
             </a:extLst>
           </p:cNvPr>
@@ -4148,7 +3662,7 @@
           <p:cNvPr id="4" name="Picture 3">
             <a:extLst>
               <a:ext uri="{FF2B5EF4-FFF2-40B4-BE49-F238E27FC236}">
-                <a16:creationId xmlns:a16="http://schemas.microsoft.com/office/drawing/2014/main" id="{E736DC20-BD61-4638-983D-FA83468D2ED2}"/>
+                <a16:creationId xmlns:a16="http://schemas.microsoft.com/office/drawing/2014/main" xmlns="" id="{E736DC20-BD61-4638-983D-FA83468D2ED2}"/>
               </a:ext>
             </a:extLst>
           </p:cNvPr>
@@ -4178,7 +3692,7 @@
           <p:cNvPr id="5" name="Picture 4">
             <a:extLst>
               <a:ext uri="{FF2B5EF4-FFF2-40B4-BE49-F238E27FC236}">
-                <a16:creationId xmlns:a16="http://schemas.microsoft.com/office/drawing/2014/main" id="{B0E1DC11-F5AB-42E3-B496-4E8DA121D027}"/>
+                <a16:creationId xmlns:a16="http://schemas.microsoft.com/office/drawing/2014/main" xmlns="" id="{B0E1DC11-F5AB-42E3-B496-4E8DA121D027}"/>
               </a:ext>
             </a:extLst>
           </p:cNvPr>
@@ -4208,7 +3722,7 @@
           <p:cNvPr id="7" name="TextBox 6">
             <a:extLst>
               <a:ext uri="{FF2B5EF4-FFF2-40B4-BE49-F238E27FC236}">
-                <a16:creationId xmlns:a16="http://schemas.microsoft.com/office/drawing/2014/main" id="{53C5B543-B104-4D98-AA5C-4AEC478EB5EA}"/>
+                <a16:creationId xmlns:a16="http://schemas.microsoft.com/office/drawing/2014/main" xmlns="" id="{53C5B543-B104-4D98-AA5C-4AEC478EB5EA}"/>
               </a:ext>
             </a:extLst>
           </p:cNvPr>
@@ -4252,10 +3766,17 @@
   <p:clrMapOvr>
     <a:masterClrMapping/>
   </p:clrMapOvr>
+  <p:timing>
+    <p:tnLst>
+      <p:par>
+        <p:cTn id="1" dur="indefinite" restart="never" nodeType="tmRoot"/>
+      </p:par>
+    </p:tnLst>
+  </p:timing>
 </p:sld>
 </file>
 
-<file path=ppt/slides/slide13.xml><?xml version="1.0" encoding="utf-8"?>
+<file path=ppt/slides/slide11.xml><?xml version="1.0" encoding="utf-8"?>
 <p:sld xmlns:a="http://schemas.openxmlformats.org/drawingml/2006/main" xmlns:r="http://schemas.openxmlformats.org/officeDocument/2006/relationships" xmlns:p="http://schemas.openxmlformats.org/presentationml/2006/main">
   <p:cSld>
     <p:spTree>
@@ -4277,7 +3798,7 @@
           <p:cNvPr id="2" name="TextBox 1">
             <a:extLst>
               <a:ext uri="{FF2B5EF4-FFF2-40B4-BE49-F238E27FC236}">
-                <a16:creationId xmlns:a16="http://schemas.microsoft.com/office/drawing/2014/main" id="{8A67A37A-C488-40D7-A088-6774405888BB}"/>
+                <a16:creationId xmlns:a16="http://schemas.microsoft.com/office/drawing/2014/main" xmlns="" id="{8A67A37A-C488-40D7-A088-6774405888BB}"/>
               </a:ext>
             </a:extLst>
           </p:cNvPr>
@@ -4315,7 +3836,7 @@
           <p:cNvPr id="9" name="Picture 8" descr="A screenshot of a computer&#10;&#10;Description automatically generated">
             <a:extLst>
               <a:ext uri="{FF2B5EF4-FFF2-40B4-BE49-F238E27FC236}">
-                <a16:creationId xmlns:a16="http://schemas.microsoft.com/office/drawing/2014/main" id="{08CDB5DC-F80B-4A62-89F1-F8F0A78F5A04}"/>
+                <a16:creationId xmlns:a16="http://schemas.microsoft.com/office/drawing/2014/main" xmlns="" id="{08CDB5DC-F80B-4A62-89F1-F8F0A78F5A04}"/>
               </a:ext>
             </a:extLst>
           </p:cNvPr>
@@ -4350,7 +3871,7 @@
           <p:cNvPr id="7" name="TextBox 6">
             <a:extLst>
               <a:ext uri="{FF2B5EF4-FFF2-40B4-BE49-F238E27FC236}">
-                <a16:creationId xmlns:a16="http://schemas.microsoft.com/office/drawing/2014/main" id="{53C5B543-B104-4D98-AA5C-4AEC478EB5EA}"/>
+                <a16:creationId xmlns:a16="http://schemas.microsoft.com/office/drawing/2014/main" xmlns="" id="{53C5B543-B104-4D98-AA5C-4AEC478EB5EA}"/>
               </a:ext>
             </a:extLst>
           </p:cNvPr>
@@ -4566,7 +4087,7 @@
           <p:cNvPr id="6" name="Picture 5">
             <a:extLst>
               <a:ext uri="{FF2B5EF4-FFF2-40B4-BE49-F238E27FC236}">
-                <a16:creationId xmlns:a16="http://schemas.microsoft.com/office/drawing/2014/main" id="{4660CBFB-081E-4BCE-BAA1-C2763602D87E}"/>
+                <a16:creationId xmlns:a16="http://schemas.microsoft.com/office/drawing/2014/main" xmlns="" id="{4660CBFB-081E-4BCE-BAA1-C2763602D87E}"/>
               </a:ext>
             </a:extLst>
           </p:cNvPr>
@@ -4601,6 +4122,13 @@
   <p:clrMapOvr>
     <a:masterClrMapping/>
   </p:clrMapOvr>
+  <p:timing>
+    <p:tnLst>
+      <p:par>
+        <p:cTn id="1" dur="indefinite" restart="never" nodeType="tmRoot"/>
+      </p:par>
+    </p:tnLst>
+  </p:timing>
 </p:sld>
 </file>
 
@@ -4626,7 +4154,7 @@
           <p:cNvPr id="2" name="TextBox 1">
             <a:extLst>
               <a:ext uri="{FF2B5EF4-FFF2-40B4-BE49-F238E27FC236}">
-                <a16:creationId xmlns:a16="http://schemas.microsoft.com/office/drawing/2014/main" id="{8A67A37A-C488-40D7-A088-6774405888BB}"/>
+                <a16:creationId xmlns:a16="http://schemas.microsoft.com/office/drawing/2014/main" xmlns="" id="{8A67A37A-C488-40D7-A088-6774405888BB}"/>
               </a:ext>
             </a:extLst>
           </p:cNvPr>
@@ -4680,7 +4208,7 @@
           <p:cNvPr id="3" name="TextBox 2">
             <a:extLst>
               <a:ext uri="{FF2B5EF4-FFF2-40B4-BE49-F238E27FC236}">
-                <a16:creationId xmlns:a16="http://schemas.microsoft.com/office/drawing/2014/main" id="{EC931DCA-4690-4B93-9419-BA902293A61A}"/>
+                <a16:creationId xmlns:a16="http://schemas.microsoft.com/office/drawing/2014/main" xmlns="" id="{EC931DCA-4690-4B93-9419-BA902293A61A}"/>
               </a:ext>
             </a:extLst>
           </p:cNvPr>
@@ -4810,6 +4338,13 @@
   <p:clrMapOvr>
     <a:masterClrMapping/>
   </p:clrMapOvr>
+  <p:timing>
+    <p:tnLst>
+      <p:par>
+        <p:cTn id="1" dur="indefinite" restart="never" nodeType="tmRoot"/>
+      </p:par>
+    </p:tnLst>
+  </p:timing>
 </p:sld>
 </file>
 
@@ -4835,7 +4370,7 @@
           <p:cNvPr id="2" name="TextBox 1">
             <a:extLst>
               <a:ext uri="{FF2B5EF4-FFF2-40B4-BE49-F238E27FC236}">
-                <a16:creationId xmlns:a16="http://schemas.microsoft.com/office/drawing/2014/main" id="{8A67A37A-C488-40D7-A088-6774405888BB}"/>
+                <a16:creationId xmlns:a16="http://schemas.microsoft.com/office/drawing/2014/main" xmlns="" id="{8A67A37A-C488-40D7-A088-6774405888BB}"/>
               </a:ext>
             </a:extLst>
           </p:cNvPr>
@@ -4889,7 +4424,7 @@
           <p:cNvPr id="3" name="TextBox 2">
             <a:extLst>
               <a:ext uri="{FF2B5EF4-FFF2-40B4-BE49-F238E27FC236}">
-                <a16:creationId xmlns:a16="http://schemas.microsoft.com/office/drawing/2014/main" id="{EC931DCA-4690-4B93-9419-BA902293A61A}"/>
+                <a16:creationId xmlns:a16="http://schemas.microsoft.com/office/drawing/2014/main" xmlns="" id="{EC931DCA-4690-4B93-9419-BA902293A61A}"/>
               </a:ext>
             </a:extLst>
           </p:cNvPr>
@@ -5139,7 +4674,7 @@
               <a:buAutoNum type="alphaLcParenR"/>
             </a:pPr>
             <a:r>
-              <a:rPr lang="en-US" sz="2400" dirty="0">
+              <a:rPr lang="en-US" sz="2400" dirty="0" smtClean="0">
                 <a:solidFill>
                   <a:schemeClr val="tx1">
                     <a:lumMod val="50000"/>
@@ -5152,21 +4687,13 @@
             <a:r>
               <a:rPr lang="en-US" sz="2400" dirty="0">
                 <a:solidFill>
-                  <a:srgbClr val="FF0000"/>
-                </a:solidFill>
-              </a:rPr>
-              <a:t>(?)</a:t>
-            </a:r>
-            <a:r>
-              <a:rPr lang="en-US" sz="2400" dirty="0">
-                <a:solidFill>
                   <a:schemeClr val="tx1">
                     <a:lumMod val="50000"/>
                     <a:lumOff val="50000"/>
                   </a:schemeClr>
                 </a:solidFill>
               </a:rPr>
-              <a:t> (used by, but not a subclass of </a:t>
+              <a:t>(used by, but not a subclass of </a:t>
             </a:r>
             <a:r>
               <a:rPr lang="en-US" sz="2400" dirty="0" err="1">
@@ -5261,6 +4788,13 @@
   <p:clrMapOvr>
     <a:masterClrMapping/>
   </p:clrMapOvr>
+  <p:timing>
+    <p:tnLst>
+      <p:par>
+        <p:cTn id="1" dur="indefinite" restart="never" nodeType="tmRoot"/>
+      </p:par>
+    </p:tnLst>
+  </p:timing>
 </p:sld>
 </file>
 
@@ -5286,7 +4820,7 @@
           <p:cNvPr id="2" name="TextBox 1">
             <a:extLst>
               <a:ext uri="{FF2B5EF4-FFF2-40B4-BE49-F238E27FC236}">
-                <a16:creationId xmlns:a16="http://schemas.microsoft.com/office/drawing/2014/main" id="{8A67A37A-C488-40D7-A088-6774405888BB}"/>
+                <a16:creationId xmlns:a16="http://schemas.microsoft.com/office/drawing/2014/main" xmlns="" id="{8A67A37A-C488-40D7-A088-6774405888BB}"/>
               </a:ext>
             </a:extLst>
           </p:cNvPr>
@@ -5314,7 +4848,7 @@
                   <a:srgbClr val="002060"/>
                 </a:solidFill>
               </a:rPr>
-              <a:t>Lab #7 (first part of Assignment #2 – </a:t>
+              <a:t>The </a:t>
             </a:r>
             <a:r>
               <a:rPr lang="en-US" sz="2800" dirty="0" err="1">
@@ -5322,7 +4856,7 @@
                   <a:srgbClr val="002060"/>
                 </a:solidFill>
               </a:rPr>
-              <a:t>Netfliz</a:t>
+              <a:t>StreamingVideo</a:t>
             </a:r>
             <a:r>
               <a:rPr lang="en-US" sz="2800" dirty="0">
@@ -5330,7 +4864,23 @@
                   <a:srgbClr val="002060"/>
                 </a:solidFill>
               </a:rPr>
-              <a:t> App)</a:t>
+              <a:t> superclass (</a:t>
+            </a:r>
+            <a:r>
+              <a:rPr lang="en-US" sz="2800" dirty="0" err="1">
+                <a:solidFill>
+                  <a:srgbClr val="002060"/>
+                </a:solidFill>
+              </a:rPr>
+              <a:t>pg</a:t>
+            </a:r>
+            <a:r>
+              <a:rPr lang="en-US" sz="2800" dirty="0">
+                <a:solidFill>
+                  <a:srgbClr val="002060"/>
+                </a:solidFill>
+              </a:rPr>
+              <a:t> 4):</a:t>
             </a:r>
           </a:p>
         </p:txBody>
@@ -5340,925 +4890,7 @@
           <p:cNvPr id="3" name="TextBox 2">
             <a:extLst>
               <a:ext uri="{FF2B5EF4-FFF2-40B4-BE49-F238E27FC236}">
-                <a16:creationId xmlns:a16="http://schemas.microsoft.com/office/drawing/2014/main" id="{EC931DCA-4690-4B93-9419-BA902293A61A}"/>
-              </a:ext>
-            </a:extLst>
-          </p:cNvPr>
-          <p:cNvSpPr txBox="1"/>
-          <p:nvPr/>
-        </p:nvSpPr>
-        <p:spPr>
-          <a:xfrm>
-            <a:off x="-148856" y="702634"/>
-            <a:ext cx="8943940" cy="5262979"/>
-          </a:xfrm>
-          <a:prstGeom prst="rect">
-            <a:avLst/>
-          </a:prstGeom>
-        </p:spPr>
-        <p:txBody>
-          <a:bodyPr wrap="square" rtlCol="0">
-            <a:spAutoFit/>
-          </a:bodyPr>
-          <a:lstStyle/>
-          <a:p>
-            <a:pPr lvl="1"/>
-            <a:r>
-              <a:rPr lang="en-US" sz="2400" u="sng" dirty="0"/>
-              <a:t>Overview of the full assignment</a:t>
-            </a:r>
-            <a:r>
-              <a:rPr lang="en-US" sz="2400" dirty="0"/>
-              <a:t>:</a:t>
-            </a:r>
-          </a:p>
-          <a:p>
-            <a:pPr marL="914400" lvl="1" indent="-457200">
-              <a:buFont typeface="+mj-lt"/>
-              <a:buAutoNum type="arabicPeriod" startAt="2"/>
-            </a:pPr>
-            <a:r>
-              <a:rPr lang="en-US" sz="2400" dirty="0">
-                <a:solidFill>
-                  <a:srgbClr val="002060"/>
-                </a:solidFill>
-              </a:rPr>
-              <a:t>The program will make use of several classes.</a:t>
-            </a:r>
-          </a:p>
-          <a:p>
-            <a:pPr marL="1257300" lvl="2" indent="-342900">
-              <a:buFont typeface="Arial" panose="020B0604020202020204" pitchFamily="34" charset="0"/>
-              <a:buChar char="•"/>
-            </a:pPr>
-            <a:r>
-              <a:rPr lang="en-US" sz="2400" dirty="0">
-                <a:solidFill>
-                  <a:schemeClr val="tx1">
-                    <a:lumMod val="50000"/>
-                    <a:lumOff val="50000"/>
-                  </a:schemeClr>
-                </a:solidFill>
-              </a:rPr>
-              <a:t>These will be the focus for the lab assignment.</a:t>
-            </a:r>
-          </a:p>
-          <a:p>
-            <a:pPr marL="914400" lvl="1" indent="-457200">
-              <a:buFont typeface="+mj-lt"/>
-              <a:buAutoNum type="arabicPeriod" startAt="2"/>
-            </a:pPr>
-            <a:endParaRPr lang="en-US" sz="2400" dirty="0">
-              <a:solidFill>
-                <a:srgbClr val="002060"/>
-              </a:solidFill>
-            </a:endParaRPr>
-          </a:p>
-          <a:p>
-            <a:pPr marL="914400" lvl="1" indent="-457200">
-              <a:buFont typeface="+mj-lt"/>
-              <a:buAutoNum type="arabicPeriod" startAt="2"/>
-            </a:pPr>
-            <a:r>
-              <a:rPr lang="en-US" sz="2400" dirty="0">
-                <a:solidFill>
-                  <a:srgbClr val="002060"/>
-                </a:solidFill>
-              </a:rPr>
-              <a:t>In total, you will need to create five classes: </a:t>
-            </a:r>
-          </a:p>
-          <a:p>
-            <a:pPr marL="1371600" lvl="2" indent="-457200">
-              <a:buFont typeface="+mj-lt"/>
-              <a:buAutoNum type="alphaLcParenR"/>
-            </a:pPr>
-            <a:r>
-              <a:rPr lang="en-US" sz="2400" dirty="0" err="1">
-                <a:solidFill>
-                  <a:schemeClr val="tx1">
-                    <a:lumMod val="50000"/>
-                    <a:lumOff val="50000"/>
-                  </a:schemeClr>
-                </a:solidFill>
-              </a:rPr>
-              <a:t>StreamingVideo</a:t>
-            </a:r>
-            <a:r>
-              <a:rPr lang="en-US" sz="2400" dirty="0">
-                <a:solidFill>
-                  <a:schemeClr val="tx1">
-                    <a:lumMod val="50000"/>
-                    <a:lumOff val="50000"/>
-                  </a:schemeClr>
-                </a:solidFill>
-              </a:rPr>
-              <a:t> (a superclass)</a:t>
-            </a:r>
-          </a:p>
-          <a:p>
-            <a:pPr marL="1885950" lvl="3" indent="-514350">
-              <a:buFont typeface="+mj-lt"/>
-              <a:buAutoNum type="romanLcPeriod"/>
-            </a:pPr>
-            <a:r>
-              <a:rPr lang="en-US" sz="2400" dirty="0">
-                <a:solidFill>
-                  <a:schemeClr val="tx1">
-                    <a:lumMod val="50000"/>
-                    <a:lumOff val="50000"/>
-                  </a:schemeClr>
-                </a:solidFill>
-              </a:rPr>
-              <a:t>Movie (extends </a:t>
-            </a:r>
-            <a:r>
-              <a:rPr lang="en-US" sz="2400" dirty="0" err="1">
-                <a:solidFill>
-                  <a:schemeClr val="tx1">
-                    <a:lumMod val="50000"/>
-                    <a:lumOff val="50000"/>
-                  </a:schemeClr>
-                </a:solidFill>
-              </a:rPr>
-              <a:t>StreamingVideo</a:t>
-            </a:r>
-            <a:r>
-              <a:rPr lang="en-US" sz="2400" dirty="0">
-                <a:solidFill>
-                  <a:schemeClr val="tx1">
-                    <a:lumMod val="50000"/>
-                    <a:lumOff val="50000"/>
-                  </a:schemeClr>
-                </a:solidFill>
-              </a:rPr>
-              <a:t>)</a:t>
-            </a:r>
-          </a:p>
-          <a:p>
-            <a:pPr marL="1885950" lvl="3" indent="-514350">
-              <a:buFont typeface="+mj-lt"/>
-              <a:buAutoNum type="romanLcPeriod"/>
-            </a:pPr>
-            <a:r>
-              <a:rPr lang="en-US" sz="2400" dirty="0" err="1">
-                <a:solidFill>
-                  <a:schemeClr val="tx1">
-                    <a:lumMod val="50000"/>
-                    <a:lumOff val="50000"/>
-                  </a:schemeClr>
-                </a:solidFill>
-              </a:rPr>
-              <a:t>TVShow</a:t>
-            </a:r>
-            <a:r>
-              <a:rPr lang="en-US" sz="2400" dirty="0">
-                <a:solidFill>
-                  <a:schemeClr val="tx1">
-                    <a:lumMod val="50000"/>
-                    <a:lumOff val="50000"/>
-                  </a:schemeClr>
-                </a:solidFill>
-              </a:rPr>
-              <a:t> (extends </a:t>
-            </a:r>
-            <a:r>
-              <a:rPr lang="en-US" sz="2400" dirty="0" err="1">
-                <a:solidFill>
-                  <a:schemeClr val="tx1">
-                    <a:lumMod val="50000"/>
-                    <a:lumOff val="50000"/>
-                  </a:schemeClr>
-                </a:solidFill>
-              </a:rPr>
-              <a:t>StreamingVideo</a:t>
-            </a:r>
-            <a:r>
-              <a:rPr lang="en-US" sz="2400" dirty="0">
-                <a:solidFill>
-                  <a:schemeClr val="tx1">
-                    <a:lumMod val="50000"/>
-                    <a:lumOff val="50000"/>
-                  </a:schemeClr>
-                </a:solidFill>
-              </a:rPr>
-              <a:t>)</a:t>
-            </a:r>
-          </a:p>
-          <a:p>
-            <a:pPr marL="1428750" lvl="2" indent="-514350">
-              <a:buFont typeface="+mj-lt"/>
-              <a:buAutoNum type="alphaLcParenR"/>
-            </a:pPr>
-            <a:r>
-              <a:rPr lang="en-US" sz="2400" dirty="0">
-                <a:solidFill>
-                  <a:schemeClr val="tx1">
-                    <a:lumMod val="50000"/>
-                    <a:lumOff val="50000"/>
-                  </a:schemeClr>
-                </a:solidFill>
-              </a:rPr>
-              <a:t>Season (used by, but not a subclass of </a:t>
-            </a:r>
-            <a:r>
-              <a:rPr lang="en-US" sz="2400" dirty="0" err="1">
-                <a:solidFill>
-                  <a:schemeClr val="tx1">
-                    <a:lumMod val="50000"/>
-                    <a:lumOff val="50000"/>
-                  </a:schemeClr>
-                </a:solidFill>
-              </a:rPr>
-              <a:t>TVShow</a:t>
-            </a:r>
-            <a:r>
-              <a:rPr lang="en-US" sz="2400" dirty="0">
-                <a:solidFill>
-                  <a:schemeClr val="tx1">
-                    <a:lumMod val="50000"/>
-                    <a:lumOff val="50000"/>
-                  </a:schemeClr>
-                </a:solidFill>
-              </a:rPr>
-              <a:t>)</a:t>
-            </a:r>
-          </a:p>
-          <a:p>
-            <a:pPr marL="1428750" lvl="2" indent="-514350">
-              <a:buFont typeface="+mj-lt"/>
-              <a:buAutoNum type="alphaLcParenR"/>
-            </a:pPr>
-            <a:r>
-              <a:rPr lang="en-US" sz="2400" dirty="0">
-                <a:solidFill>
-                  <a:schemeClr val="tx1">
-                    <a:lumMod val="50000"/>
-                    <a:lumOff val="50000"/>
-                  </a:schemeClr>
-                </a:solidFill>
-              </a:rPr>
-              <a:t>Episode </a:t>
-            </a:r>
-            <a:r>
-              <a:rPr lang="en-US" sz="2400" dirty="0">
-                <a:solidFill>
-                  <a:srgbClr val="FF0000"/>
-                </a:solidFill>
-              </a:rPr>
-              <a:t>(?)</a:t>
-            </a:r>
-            <a:r>
-              <a:rPr lang="en-US" sz="2400" dirty="0">
-                <a:solidFill>
-                  <a:schemeClr val="tx1">
-                    <a:lumMod val="50000"/>
-                    <a:lumOff val="50000"/>
-                  </a:schemeClr>
-                </a:solidFill>
-              </a:rPr>
-              <a:t> (used by, but not a subclass of </a:t>
-            </a:r>
-            <a:r>
-              <a:rPr lang="en-US" sz="2400" dirty="0" err="1">
-                <a:solidFill>
-                  <a:schemeClr val="tx1">
-                    <a:lumMod val="50000"/>
-                    <a:lumOff val="50000"/>
-                  </a:schemeClr>
-                </a:solidFill>
-              </a:rPr>
-              <a:t>TVShow</a:t>
-            </a:r>
-            <a:r>
-              <a:rPr lang="en-US" sz="2400" dirty="0">
-                <a:solidFill>
-                  <a:schemeClr val="tx1">
-                    <a:lumMod val="50000"/>
-                    <a:lumOff val="50000"/>
-                  </a:schemeClr>
-                </a:solidFill>
-              </a:rPr>
-              <a:t>)</a:t>
-            </a:r>
-            <a:endParaRPr lang="en-US" sz="2400" dirty="0">
-              <a:solidFill>
-                <a:srgbClr val="FF0000"/>
-              </a:solidFill>
-            </a:endParaRPr>
-          </a:p>
-          <a:p>
-            <a:pPr marL="1371600" lvl="2" indent="-457200">
-              <a:buFont typeface="+mj-lt"/>
-              <a:buAutoNum type="alphaLcParenR"/>
-            </a:pPr>
-            <a:endParaRPr lang="en-US" sz="2400" dirty="0">
-              <a:solidFill>
-                <a:schemeClr val="tx1">
-                  <a:lumMod val="50000"/>
-                  <a:lumOff val="50000"/>
-                </a:schemeClr>
-              </a:solidFill>
-            </a:endParaRPr>
-          </a:p>
-          <a:p>
-            <a:pPr lvl="2"/>
-            <a:endParaRPr lang="en-US" sz="2400" dirty="0">
-              <a:solidFill>
-                <a:schemeClr val="tx1">
-                  <a:lumMod val="50000"/>
-                  <a:lumOff val="50000"/>
-                </a:schemeClr>
-              </a:solidFill>
-            </a:endParaRPr>
-          </a:p>
-          <a:p>
-            <a:pPr marL="1371600" lvl="2" indent="-457200">
-              <a:buFont typeface="Arial" panose="020B0604020202020204" pitchFamily="34" charset="0"/>
-              <a:buChar char="•"/>
-            </a:pPr>
-            <a:endParaRPr lang="en-US" sz="2400" dirty="0">
-              <a:solidFill>
-                <a:schemeClr val="tx1">
-                  <a:lumMod val="50000"/>
-                  <a:lumOff val="50000"/>
-                </a:schemeClr>
-              </a:solidFill>
-            </a:endParaRPr>
-          </a:p>
-          <a:p>
-            <a:pPr marL="1371600" lvl="2" indent="-457200">
-              <a:buFont typeface="Arial" panose="020B0604020202020204" pitchFamily="34" charset="0"/>
-              <a:buChar char="•"/>
-            </a:pPr>
-            <a:endParaRPr lang="en-US" sz="2400" dirty="0">
-              <a:solidFill>
-                <a:schemeClr val="tx1">
-                  <a:lumMod val="50000"/>
-                  <a:lumOff val="50000"/>
-                </a:schemeClr>
-              </a:solidFill>
-            </a:endParaRPr>
-          </a:p>
-        </p:txBody>
-      </p:sp>
-    </p:spTree>
-    <p:extLst>
-      <p:ext uri="{BB962C8B-B14F-4D97-AF65-F5344CB8AC3E}">
-        <p14:creationId xmlns:p14="http://schemas.microsoft.com/office/powerpoint/2010/main" val="4045637776"/>
-      </p:ext>
-    </p:extLst>
-  </p:cSld>
-  <p:clrMapOvr>
-    <a:masterClrMapping/>
-  </p:clrMapOvr>
-</p:sld>
-</file>
-
-<file path=ppt/slides/slide5.xml><?xml version="1.0" encoding="utf-8"?>
-<p:sld xmlns:a="http://schemas.openxmlformats.org/drawingml/2006/main" xmlns:r="http://schemas.openxmlformats.org/officeDocument/2006/relationships" xmlns:p="http://schemas.openxmlformats.org/presentationml/2006/main">
-  <p:cSld>
-    <p:spTree>
-      <p:nvGrpSpPr>
-        <p:cNvPr id="1" name=""/>
-        <p:cNvGrpSpPr/>
-        <p:nvPr/>
-      </p:nvGrpSpPr>
-      <p:grpSpPr>
-        <a:xfrm>
-          <a:off x="0" y="0"/>
-          <a:ext cx="0" cy="0"/>
-          <a:chOff x="0" y="0"/>
-          <a:chExt cx="0" cy="0"/>
-        </a:xfrm>
-      </p:grpSpPr>
-      <p:sp>
-        <p:nvSpPr>
-          <p:cNvPr id="2" name="TextBox 1">
-            <a:extLst>
-              <a:ext uri="{FF2B5EF4-FFF2-40B4-BE49-F238E27FC236}">
-                <a16:creationId xmlns:a16="http://schemas.microsoft.com/office/drawing/2014/main" id="{8A67A37A-C488-40D7-A088-6774405888BB}"/>
-              </a:ext>
-            </a:extLst>
-          </p:cNvPr>
-          <p:cNvSpPr txBox="1"/>
-          <p:nvPr/>
-        </p:nvSpPr>
-        <p:spPr>
-          <a:xfrm>
-            <a:off x="0" y="0"/>
-            <a:ext cx="8134066" cy="523220"/>
-          </a:xfrm>
-          <a:prstGeom prst="rect">
-            <a:avLst/>
-          </a:prstGeom>
-        </p:spPr>
-        <p:txBody>
-          <a:bodyPr rtlCol="0">
-            <a:spAutoFit/>
-          </a:bodyPr>
-          <a:lstStyle/>
-          <a:p>
-            <a:r>
-              <a:rPr lang="en-US" sz="2800" dirty="0">
-                <a:solidFill>
-                  <a:srgbClr val="002060"/>
-                </a:solidFill>
-              </a:rPr>
-              <a:t>Lab #7 (first part of Assignment #2 – </a:t>
-            </a:r>
-            <a:r>
-              <a:rPr lang="en-US" sz="2800" dirty="0" err="1">
-                <a:solidFill>
-                  <a:srgbClr val="002060"/>
-                </a:solidFill>
-              </a:rPr>
-              <a:t>Netfliz</a:t>
-            </a:r>
-            <a:r>
-              <a:rPr lang="en-US" sz="2800" dirty="0">
-                <a:solidFill>
-                  <a:srgbClr val="002060"/>
-                </a:solidFill>
-              </a:rPr>
-              <a:t> App)</a:t>
-            </a:r>
-          </a:p>
-        </p:txBody>
-      </p:sp>
-      <p:sp>
-        <p:nvSpPr>
-          <p:cNvPr id="3" name="TextBox 2">
-            <a:extLst>
-              <a:ext uri="{FF2B5EF4-FFF2-40B4-BE49-F238E27FC236}">
-                <a16:creationId xmlns:a16="http://schemas.microsoft.com/office/drawing/2014/main" id="{EC931DCA-4690-4B93-9419-BA902293A61A}"/>
-              </a:ext>
-            </a:extLst>
-          </p:cNvPr>
-          <p:cNvSpPr txBox="1"/>
-          <p:nvPr/>
-        </p:nvSpPr>
-        <p:spPr>
-          <a:xfrm>
-            <a:off x="-148856" y="702634"/>
-            <a:ext cx="8943940" cy="5262979"/>
-          </a:xfrm>
-          <a:prstGeom prst="rect">
-            <a:avLst/>
-          </a:prstGeom>
-        </p:spPr>
-        <p:txBody>
-          <a:bodyPr wrap="square" rtlCol="0">
-            <a:spAutoFit/>
-          </a:bodyPr>
-          <a:lstStyle/>
-          <a:p>
-            <a:pPr lvl="1"/>
-            <a:r>
-              <a:rPr lang="en-US" sz="2400" u="sng" dirty="0"/>
-              <a:t>Overview of the full assignment</a:t>
-            </a:r>
-            <a:r>
-              <a:rPr lang="en-US" sz="2400" dirty="0"/>
-              <a:t>:</a:t>
-            </a:r>
-          </a:p>
-          <a:p>
-            <a:pPr marL="914400" lvl="1" indent="-457200">
-              <a:buFont typeface="+mj-lt"/>
-              <a:buAutoNum type="arabicPeriod" startAt="2"/>
-            </a:pPr>
-            <a:r>
-              <a:rPr lang="en-US" sz="2400" dirty="0">
-                <a:solidFill>
-                  <a:srgbClr val="002060"/>
-                </a:solidFill>
-              </a:rPr>
-              <a:t>The program will make use of several classes.</a:t>
-            </a:r>
-          </a:p>
-          <a:p>
-            <a:pPr marL="1257300" lvl="2" indent="-342900">
-              <a:buFont typeface="Arial" panose="020B0604020202020204" pitchFamily="34" charset="0"/>
-              <a:buChar char="•"/>
-            </a:pPr>
-            <a:r>
-              <a:rPr lang="en-US" sz="2400" dirty="0">
-                <a:solidFill>
-                  <a:schemeClr val="tx1">
-                    <a:lumMod val="50000"/>
-                    <a:lumOff val="50000"/>
-                  </a:schemeClr>
-                </a:solidFill>
-              </a:rPr>
-              <a:t>These will be the focus for the lab assignment.</a:t>
-            </a:r>
-          </a:p>
-          <a:p>
-            <a:pPr marL="914400" lvl="1" indent="-457200">
-              <a:buFont typeface="+mj-lt"/>
-              <a:buAutoNum type="arabicPeriod" startAt="2"/>
-            </a:pPr>
-            <a:endParaRPr lang="en-US" sz="2400" dirty="0">
-              <a:solidFill>
-                <a:srgbClr val="002060"/>
-              </a:solidFill>
-            </a:endParaRPr>
-          </a:p>
-          <a:p>
-            <a:pPr marL="914400" lvl="1" indent="-457200">
-              <a:buFont typeface="+mj-lt"/>
-              <a:buAutoNum type="arabicPeriod" startAt="2"/>
-            </a:pPr>
-            <a:r>
-              <a:rPr lang="en-US" sz="2400" dirty="0">
-                <a:solidFill>
-                  <a:srgbClr val="002060"/>
-                </a:solidFill>
-              </a:rPr>
-              <a:t>In total, you will need to create five classes: </a:t>
-            </a:r>
-          </a:p>
-          <a:p>
-            <a:pPr marL="1371600" lvl="2" indent="-457200">
-              <a:buFont typeface="+mj-lt"/>
-              <a:buAutoNum type="alphaLcParenR"/>
-            </a:pPr>
-            <a:r>
-              <a:rPr lang="en-US" sz="2400" dirty="0" err="1">
-                <a:solidFill>
-                  <a:schemeClr val="tx1">
-                    <a:lumMod val="50000"/>
-                    <a:lumOff val="50000"/>
-                  </a:schemeClr>
-                </a:solidFill>
-              </a:rPr>
-              <a:t>StreamingVideo</a:t>
-            </a:r>
-            <a:r>
-              <a:rPr lang="en-US" sz="2400" dirty="0">
-                <a:solidFill>
-                  <a:schemeClr val="tx1">
-                    <a:lumMod val="50000"/>
-                    <a:lumOff val="50000"/>
-                  </a:schemeClr>
-                </a:solidFill>
-              </a:rPr>
-              <a:t> (a superclass)</a:t>
-            </a:r>
-          </a:p>
-          <a:p>
-            <a:pPr marL="1885950" lvl="3" indent="-514350">
-              <a:buFont typeface="+mj-lt"/>
-              <a:buAutoNum type="romanLcPeriod"/>
-            </a:pPr>
-            <a:r>
-              <a:rPr lang="en-US" sz="2400" dirty="0">
-                <a:solidFill>
-                  <a:schemeClr val="tx1">
-                    <a:lumMod val="50000"/>
-                    <a:lumOff val="50000"/>
-                  </a:schemeClr>
-                </a:solidFill>
-              </a:rPr>
-              <a:t>Movie (extends </a:t>
-            </a:r>
-            <a:r>
-              <a:rPr lang="en-US" sz="2400" dirty="0" err="1">
-                <a:solidFill>
-                  <a:schemeClr val="tx1">
-                    <a:lumMod val="50000"/>
-                    <a:lumOff val="50000"/>
-                  </a:schemeClr>
-                </a:solidFill>
-              </a:rPr>
-              <a:t>StreamingVideo</a:t>
-            </a:r>
-            <a:r>
-              <a:rPr lang="en-US" sz="2400" dirty="0">
-                <a:solidFill>
-                  <a:schemeClr val="tx1">
-                    <a:lumMod val="50000"/>
-                    <a:lumOff val="50000"/>
-                  </a:schemeClr>
-                </a:solidFill>
-              </a:rPr>
-              <a:t>)</a:t>
-            </a:r>
-          </a:p>
-          <a:p>
-            <a:pPr marL="1885950" lvl="3" indent="-514350">
-              <a:buFont typeface="+mj-lt"/>
-              <a:buAutoNum type="romanLcPeriod"/>
-            </a:pPr>
-            <a:r>
-              <a:rPr lang="en-US" sz="2400" dirty="0" err="1">
-                <a:solidFill>
-                  <a:schemeClr val="tx1">
-                    <a:lumMod val="50000"/>
-                    <a:lumOff val="50000"/>
-                  </a:schemeClr>
-                </a:solidFill>
-              </a:rPr>
-              <a:t>TVShow</a:t>
-            </a:r>
-            <a:r>
-              <a:rPr lang="en-US" sz="2400" dirty="0">
-                <a:solidFill>
-                  <a:schemeClr val="tx1">
-                    <a:lumMod val="50000"/>
-                    <a:lumOff val="50000"/>
-                  </a:schemeClr>
-                </a:solidFill>
-              </a:rPr>
-              <a:t> (extends </a:t>
-            </a:r>
-            <a:r>
-              <a:rPr lang="en-US" sz="2400" dirty="0" err="1">
-                <a:solidFill>
-                  <a:schemeClr val="tx1">
-                    <a:lumMod val="50000"/>
-                    <a:lumOff val="50000"/>
-                  </a:schemeClr>
-                </a:solidFill>
-              </a:rPr>
-              <a:t>StreamingVideo</a:t>
-            </a:r>
-            <a:r>
-              <a:rPr lang="en-US" sz="2400" dirty="0">
-                <a:solidFill>
-                  <a:schemeClr val="tx1">
-                    <a:lumMod val="50000"/>
-                    <a:lumOff val="50000"/>
-                  </a:schemeClr>
-                </a:solidFill>
-              </a:rPr>
-              <a:t>)</a:t>
-            </a:r>
-          </a:p>
-          <a:p>
-            <a:pPr marL="1428750" lvl="2" indent="-514350">
-              <a:buFont typeface="+mj-lt"/>
-              <a:buAutoNum type="alphaLcParenR"/>
-            </a:pPr>
-            <a:r>
-              <a:rPr lang="en-US" sz="2400" dirty="0">
-                <a:solidFill>
-                  <a:schemeClr val="tx1">
-                    <a:lumMod val="50000"/>
-                    <a:lumOff val="50000"/>
-                  </a:schemeClr>
-                </a:solidFill>
-              </a:rPr>
-              <a:t>Season (used by, but not a subclass of </a:t>
-            </a:r>
-            <a:r>
-              <a:rPr lang="en-US" sz="2400" dirty="0" err="1">
-                <a:solidFill>
-                  <a:schemeClr val="tx1">
-                    <a:lumMod val="50000"/>
-                    <a:lumOff val="50000"/>
-                  </a:schemeClr>
-                </a:solidFill>
-              </a:rPr>
-              <a:t>TVShow</a:t>
-            </a:r>
-            <a:r>
-              <a:rPr lang="en-US" sz="2400" dirty="0">
-                <a:solidFill>
-                  <a:schemeClr val="tx1">
-                    <a:lumMod val="50000"/>
-                    <a:lumOff val="50000"/>
-                  </a:schemeClr>
-                </a:solidFill>
-              </a:rPr>
-              <a:t>)</a:t>
-            </a:r>
-          </a:p>
-          <a:p>
-            <a:pPr marL="1428750" lvl="2" indent="-514350">
-              <a:buFont typeface="+mj-lt"/>
-              <a:buAutoNum type="alphaLcParenR"/>
-            </a:pPr>
-            <a:r>
-              <a:rPr lang="en-US" sz="2400" dirty="0">
-                <a:solidFill>
-                  <a:schemeClr val="tx1">
-                    <a:lumMod val="50000"/>
-                    <a:lumOff val="50000"/>
-                  </a:schemeClr>
-                </a:solidFill>
-              </a:rPr>
-              <a:t>Episode </a:t>
-            </a:r>
-            <a:r>
-              <a:rPr lang="en-US" sz="2400" dirty="0">
-                <a:solidFill>
-                  <a:srgbClr val="FF0000"/>
-                </a:solidFill>
-              </a:rPr>
-              <a:t>(?)</a:t>
-            </a:r>
-            <a:r>
-              <a:rPr lang="en-US" sz="2400" dirty="0">
-                <a:solidFill>
-                  <a:schemeClr val="tx1">
-                    <a:lumMod val="50000"/>
-                    <a:lumOff val="50000"/>
-                  </a:schemeClr>
-                </a:solidFill>
-              </a:rPr>
-              <a:t> (used by, but not a subclass of </a:t>
-            </a:r>
-            <a:r>
-              <a:rPr lang="en-US" sz="2400" dirty="0" err="1">
-                <a:solidFill>
-                  <a:schemeClr val="tx1">
-                    <a:lumMod val="50000"/>
-                    <a:lumOff val="50000"/>
-                  </a:schemeClr>
-                </a:solidFill>
-              </a:rPr>
-              <a:t>TVShow</a:t>
-            </a:r>
-            <a:r>
-              <a:rPr lang="en-US" sz="2400" dirty="0">
-                <a:solidFill>
-                  <a:schemeClr val="tx1">
-                    <a:lumMod val="50000"/>
-                    <a:lumOff val="50000"/>
-                  </a:schemeClr>
-                </a:solidFill>
-              </a:rPr>
-              <a:t>)</a:t>
-            </a:r>
-            <a:endParaRPr lang="en-US" sz="2400" dirty="0">
-              <a:solidFill>
-                <a:srgbClr val="FF0000"/>
-              </a:solidFill>
-            </a:endParaRPr>
-          </a:p>
-          <a:p>
-            <a:pPr marL="1371600" lvl="2" indent="-457200">
-              <a:buFont typeface="+mj-lt"/>
-              <a:buAutoNum type="alphaLcParenR"/>
-            </a:pPr>
-            <a:endParaRPr lang="en-US" sz="2400" dirty="0">
-              <a:solidFill>
-                <a:schemeClr val="tx1">
-                  <a:lumMod val="50000"/>
-                  <a:lumOff val="50000"/>
-                </a:schemeClr>
-              </a:solidFill>
-            </a:endParaRPr>
-          </a:p>
-          <a:p>
-            <a:pPr lvl="2"/>
-            <a:endParaRPr lang="en-US" sz="2400" dirty="0">
-              <a:solidFill>
-                <a:schemeClr val="tx1">
-                  <a:lumMod val="50000"/>
-                  <a:lumOff val="50000"/>
-                </a:schemeClr>
-              </a:solidFill>
-            </a:endParaRPr>
-          </a:p>
-          <a:p>
-            <a:pPr marL="1371600" lvl="2" indent="-457200">
-              <a:buFont typeface="Arial" panose="020B0604020202020204" pitchFamily="34" charset="0"/>
-              <a:buChar char="•"/>
-            </a:pPr>
-            <a:endParaRPr lang="en-US" sz="2400" dirty="0">
-              <a:solidFill>
-                <a:schemeClr val="tx1">
-                  <a:lumMod val="50000"/>
-                  <a:lumOff val="50000"/>
-                </a:schemeClr>
-              </a:solidFill>
-            </a:endParaRPr>
-          </a:p>
-          <a:p>
-            <a:pPr marL="1371600" lvl="2" indent="-457200">
-              <a:buFont typeface="Arial" panose="020B0604020202020204" pitchFamily="34" charset="0"/>
-              <a:buChar char="•"/>
-            </a:pPr>
-            <a:endParaRPr lang="en-US" sz="2400" dirty="0">
-              <a:solidFill>
-                <a:schemeClr val="tx1">
-                  <a:lumMod val="50000"/>
-                  <a:lumOff val="50000"/>
-                </a:schemeClr>
-              </a:solidFill>
-            </a:endParaRPr>
-          </a:p>
-        </p:txBody>
-      </p:sp>
-    </p:spTree>
-    <p:extLst>
-      <p:ext uri="{BB962C8B-B14F-4D97-AF65-F5344CB8AC3E}">
-        <p14:creationId xmlns:p14="http://schemas.microsoft.com/office/powerpoint/2010/main" val="1334841612"/>
-      </p:ext>
-    </p:extLst>
-  </p:cSld>
-  <p:clrMapOvr>
-    <a:masterClrMapping/>
-  </p:clrMapOvr>
-</p:sld>
-</file>
-
-<file path=ppt/slides/slide6.xml><?xml version="1.0" encoding="utf-8"?>
-<p:sld xmlns:a="http://schemas.openxmlformats.org/drawingml/2006/main" xmlns:r="http://schemas.openxmlformats.org/officeDocument/2006/relationships" xmlns:p="http://schemas.openxmlformats.org/presentationml/2006/main">
-  <p:cSld>
-    <p:spTree>
-      <p:nvGrpSpPr>
-        <p:cNvPr id="1" name=""/>
-        <p:cNvGrpSpPr/>
-        <p:nvPr/>
-      </p:nvGrpSpPr>
-      <p:grpSpPr>
-        <a:xfrm>
-          <a:off x="0" y="0"/>
-          <a:ext cx="0" cy="0"/>
-          <a:chOff x="0" y="0"/>
-          <a:chExt cx="0" cy="0"/>
-        </a:xfrm>
-      </p:grpSpPr>
-      <p:sp>
-        <p:nvSpPr>
-          <p:cNvPr id="2" name="TextBox 1">
-            <a:extLst>
-              <a:ext uri="{FF2B5EF4-FFF2-40B4-BE49-F238E27FC236}">
-                <a16:creationId xmlns:a16="http://schemas.microsoft.com/office/drawing/2014/main" id="{8A67A37A-C488-40D7-A088-6774405888BB}"/>
-              </a:ext>
-            </a:extLst>
-          </p:cNvPr>
-          <p:cNvSpPr txBox="1"/>
-          <p:nvPr/>
-        </p:nvSpPr>
-        <p:spPr>
-          <a:xfrm>
-            <a:off x="0" y="0"/>
-            <a:ext cx="8134066" cy="523220"/>
-          </a:xfrm>
-          <a:prstGeom prst="rect">
-            <a:avLst/>
-          </a:prstGeom>
-        </p:spPr>
-        <p:txBody>
-          <a:bodyPr rtlCol="0">
-            <a:spAutoFit/>
-          </a:bodyPr>
-          <a:lstStyle/>
-          <a:p>
-            <a:r>
-              <a:rPr lang="en-US" sz="2800" dirty="0">
-                <a:solidFill>
-                  <a:srgbClr val="002060"/>
-                </a:solidFill>
-              </a:rPr>
-              <a:t>The </a:t>
-            </a:r>
-            <a:r>
-              <a:rPr lang="en-US" sz="2800" dirty="0" err="1">
-                <a:solidFill>
-                  <a:srgbClr val="002060"/>
-                </a:solidFill>
-              </a:rPr>
-              <a:t>StreamingVideo</a:t>
-            </a:r>
-            <a:r>
-              <a:rPr lang="en-US" sz="2800" dirty="0">
-                <a:solidFill>
-                  <a:srgbClr val="002060"/>
-                </a:solidFill>
-              </a:rPr>
-              <a:t> superclass (</a:t>
-            </a:r>
-            <a:r>
-              <a:rPr lang="en-US" sz="2800" dirty="0" err="1">
-                <a:solidFill>
-                  <a:srgbClr val="002060"/>
-                </a:solidFill>
-              </a:rPr>
-              <a:t>pg</a:t>
-            </a:r>
-            <a:r>
-              <a:rPr lang="en-US" sz="2800" dirty="0">
-                <a:solidFill>
-                  <a:srgbClr val="002060"/>
-                </a:solidFill>
-              </a:rPr>
-              <a:t> 4):</a:t>
-            </a:r>
-          </a:p>
-        </p:txBody>
-      </p:sp>
-      <p:sp>
-        <p:nvSpPr>
-          <p:cNvPr id="3" name="TextBox 2">
-            <a:extLst>
-              <a:ext uri="{FF2B5EF4-FFF2-40B4-BE49-F238E27FC236}">
-                <a16:creationId xmlns:a16="http://schemas.microsoft.com/office/drawing/2014/main" id="{EC931DCA-4690-4B93-9419-BA902293A61A}"/>
+                <a16:creationId xmlns:a16="http://schemas.microsoft.com/office/drawing/2014/main" xmlns="" id="{EC931DCA-4690-4B93-9419-BA902293A61A}"/>
               </a:ext>
             </a:extLst>
           </p:cNvPr>
@@ -6356,7 +4988,7 @@
           <p:cNvPr id="5" name="TextBox 4">
             <a:extLst>
               <a:ext uri="{FF2B5EF4-FFF2-40B4-BE49-F238E27FC236}">
-                <a16:creationId xmlns:a16="http://schemas.microsoft.com/office/drawing/2014/main" id="{EC931DCA-4690-4B93-9419-BA902293A61A}"/>
+                <a16:creationId xmlns:a16="http://schemas.microsoft.com/office/drawing/2014/main" xmlns="" id="{EC931DCA-4690-4B93-9419-BA902293A61A}"/>
               </a:ext>
             </a:extLst>
           </p:cNvPr>
@@ -6461,10 +5093,17 @@
   <p:clrMapOvr>
     <a:masterClrMapping/>
   </p:clrMapOvr>
+  <p:timing>
+    <p:tnLst>
+      <p:par>
+        <p:cTn id="1" dur="indefinite" restart="never" nodeType="tmRoot"/>
+      </p:par>
+    </p:tnLst>
+  </p:timing>
 </p:sld>
 </file>
 
-<file path=ppt/slides/slide7.xml><?xml version="1.0" encoding="utf-8"?>
+<file path=ppt/slides/slide5.xml><?xml version="1.0" encoding="utf-8"?>
 <p:sld xmlns:a="http://schemas.openxmlformats.org/drawingml/2006/main" xmlns:r="http://schemas.openxmlformats.org/officeDocument/2006/relationships" xmlns:p="http://schemas.openxmlformats.org/presentationml/2006/main">
   <p:cSld>
     <p:spTree>
@@ -6486,7 +5125,7 @@
           <p:cNvPr id="2" name="TextBox 1">
             <a:extLst>
               <a:ext uri="{FF2B5EF4-FFF2-40B4-BE49-F238E27FC236}">
-                <a16:creationId xmlns:a16="http://schemas.microsoft.com/office/drawing/2014/main" id="{8A67A37A-C488-40D7-A088-6774405888BB}"/>
+                <a16:creationId xmlns:a16="http://schemas.microsoft.com/office/drawing/2014/main" xmlns="" id="{8A67A37A-C488-40D7-A088-6774405888BB}"/>
               </a:ext>
             </a:extLst>
           </p:cNvPr>
@@ -6540,7 +5179,7 @@
           <p:cNvPr id="3" name="TextBox 2">
             <a:extLst>
               <a:ext uri="{FF2B5EF4-FFF2-40B4-BE49-F238E27FC236}">
-                <a16:creationId xmlns:a16="http://schemas.microsoft.com/office/drawing/2014/main" id="{EC931DCA-4690-4B93-9419-BA902293A61A}"/>
+                <a16:creationId xmlns:a16="http://schemas.microsoft.com/office/drawing/2014/main" xmlns="" id="{EC931DCA-4690-4B93-9419-BA902293A61A}"/>
               </a:ext>
             </a:extLst>
           </p:cNvPr>
@@ -6766,10 +5405,17 @@
   <p:clrMapOvr>
     <a:masterClrMapping/>
   </p:clrMapOvr>
+  <p:timing>
+    <p:tnLst>
+      <p:par>
+        <p:cTn id="1" dur="indefinite" restart="never" nodeType="tmRoot"/>
+      </p:par>
+    </p:tnLst>
+  </p:timing>
 </p:sld>
 </file>
 
-<file path=ppt/slides/slide8.xml><?xml version="1.0" encoding="utf-8"?>
+<file path=ppt/slides/slide6.xml><?xml version="1.0" encoding="utf-8"?>
 <p:sld xmlns:a="http://schemas.openxmlformats.org/drawingml/2006/main" xmlns:r="http://schemas.openxmlformats.org/officeDocument/2006/relationships" xmlns:p="http://schemas.openxmlformats.org/presentationml/2006/main">
   <p:cSld>
     <p:spTree>
@@ -6791,7 +5437,7 @@
           <p:cNvPr id="2" name="TextBox 1">
             <a:extLst>
               <a:ext uri="{FF2B5EF4-FFF2-40B4-BE49-F238E27FC236}">
-                <a16:creationId xmlns:a16="http://schemas.microsoft.com/office/drawing/2014/main" id="{8A67A37A-C488-40D7-A088-6774405888BB}"/>
+                <a16:creationId xmlns:a16="http://schemas.microsoft.com/office/drawing/2014/main" xmlns="" id="{8A67A37A-C488-40D7-A088-6774405888BB}"/>
               </a:ext>
             </a:extLst>
           </p:cNvPr>
@@ -6845,7 +5491,7 @@
           <p:cNvPr id="3" name="TextBox 2">
             <a:extLst>
               <a:ext uri="{FF2B5EF4-FFF2-40B4-BE49-F238E27FC236}">
-                <a16:creationId xmlns:a16="http://schemas.microsoft.com/office/drawing/2014/main" id="{EC931DCA-4690-4B93-9419-BA902293A61A}"/>
+                <a16:creationId xmlns:a16="http://schemas.microsoft.com/office/drawing/2014/main" xmlns="" id="{EC931DCA-4690-4B93-9419-BA902293A61A}"/>
               </a:ext>
             </a:extLst>
           </p:cNvPr>
@@ -6973,7 +5619,7 @@
           <p:cNvPr id="4" name="Picture 3">
             <a:extLst>
               <a:ext uri="{FF2B5EF4-FFF2-40B4-BE49-F238E27FC236}">
-                <a16:creationId xmlns:a16="http://schemas.microsoft.com/office/drawing/2014/main" id="{A24A8940-66D8-43DE-BDB7-171F957C7932}"/>
+                <a16:creationId xmlns:a16="http://schemas.microsoft.com/office/drawing/2014/main" xmlns="" id="{A24A8940-66D8-43DE-BDB7-171F957C7932}"/>
               </a:ext>
             </a:extLst>
           </p:cNvPr>
@@ -7008,10 +5654,17 @@
   <p:clrMapOvr>
     <a:masterClrMapping/>
   </p:clrMapOvr>
+  <p:timing>
+    <p:tnLst>
+      <p:par>
+        <p:cTn id="1" dur="indefinite" restart="never" nodeType="tmRoot"/>
+      </p:par>
+    </p:tnLst>
+  </p:timing>
 </p:sld>
 </file>
 
-<file path=ppt/slides/slide9.xml><?xml version="1.0" encoding="utf-8"?>
+<file path=ppt/slides/slide7.xml><?xml version="1.0" encoding="utf-8"?>
 <p:sld xmlns:a="http://schemas.openxmlformats.org/drawingml/2006/main" xmlns:r="http://schemas.openxmlformats.org/officeDocument/2006/relationships" xmlns:p="http://schemas.openxmlformats.org/presentationml/2006/main">
   <p:cSld>
     <p:spTree>
@@ -7033,7 +5686,7 @@
           <p:cNvPr id="2" name="TextBox 1">
             <a:extLst>
               <a:ext uri="{FF2B5EF4-FFF2-40B4-BE49-F238E27FC236}">
-                <a16:creationId xmlns:a16="http://schemas.microsoft.com/office/drawing/2014/main" id="{8A67A37A-C488-40D7-A088-6774405888BB}"/>
+                <a16:creationId xmlns:a16="http://schemas.microsoft.com/office/drawing/2014/main" xmlns="" id="{8A67A37A-C488-40D7-A088-6774405888BB}"/>
               </a:ext>
             </a:extLst>
           </p:cNvPr>
@@ -7103,7 +5756,7 @@
           <p:cNvPr id="3" name="TextBox 2">
             <a:extLst>
               <a:ext uri="{FF2B5EF4-FFF2-40B4-BE49-F238E27FC236}">
-                <a16:creationId xmlns:a16="http://schemas.microsoft.com/office/drawing/2014/main" id="{EC931DCA-4690-4B93-9419-BA902293A61A}"/>
+                <a16:creationId xmlns:a16="http://schemas.microsoft.com/office/drawing/2014/main" xmlns="" id="{EC931DCA-4690-4B93-9419-BA902293A61A}"/>
               </a:ext>
             </a:extLst>
           </p:cNvPr>
@@ -7219,7 +5872,7 @@
           <p:cNvPr id="4" name="Picture 3">
             <a:extLst>
               <a:ext uri="{FF2B5EF4-FFF2-40B4-BE49-F238E27FC236}">
-                <a16:creationId xmlns:a16="http://schemas.microsoft.com/office/drawing/2014/main" id="{9B196F80-B06D-4593-94E7-8B1993788732}"/>
+                <a16:creationId xmlns:a16="http://schemas.microsoft.com/office/drawing/2014/main" xmlns="" id="{9B196F80-B06D-4593-94E7-8B1993788732}"/>
               </a:ext>
             </a:extLst>
           </p:cNvPr>
@@ -7254,6 +5907,1955 @@
   <p:clrMapOvr>
     <a:masterClrMapping/>
   </p:clrMapOvr>
+  <p:timing>
+    <p:tnLst>
+      <p:par>
+        <p:cTn id="1" dur="indefinite" restart="never" nodeType="tmRoot"/>
+      </p:par>
+    </p:tnLst>
+  </p:timing>
+</p:sld>
+</file>
+
+<file path=ppt/slides/slide8.xml><?xml version="1.0" encoding="utf-8"?>
+<p:sld xmlns:a="http://schemas.openxmlformats.org/drawingml/2006/main" xmlns:r="http://schemas.openxmlformats.org/officeDocument/2006/relationships" xmlns:p="http://schemas.openxmlformats.org/presentationml/2006/main">
+  <p:cSld>
+    <p:spTree>
+      <p:nvGrpSpPr>
+        <p:cNvPr id="1" name=""/>
+        <p:cNvGrpSpPr/>
+        <p:nvPr/>
+      </p:nvGrpSpPr>
+      <p:grpSpPr>
+        <a:xfrm>
+          <a:off x="0" y="0"/>
+          <a:ext cx="0" cy="0"/>
+          <a:chOff x="0" y="0"/>
+          <a:chExt cx="0" cy="0"/>
+        </a:xfrm>
+      </p:grpSpPr>
+      <p:sp>
+        <p:nvSpPr>
+          <p:cNvPr id="2" name="TextBox 1">
+            <a:extLst>
+              <a:ext uri="{FF2B5EF4-FFF2-40B4-BE49-F238E27FC236}">
+                <a16:creationId xmlns:a16="http://schemas.microsoft.com/office/drawing/2014/main" xmlns="" id="{8A67A37A-C488-40D7-A088-6774405888BB}"/>
+              </a:ext>
+            </a:extLst>
+          </p:cNvPr>
+          <p:cNvSpPr txBox="1"/>
+          <p:nvPr/>
+        </p:nvSpPr>
+        <p:spPr>
+          <a:xfrm>
+            <a:off x="0" y="0"/>
+            <a:ext cx="8134066" cy="461665"/>
+          </a:xfrm>
+          <a:prstGeom prst="rect">
+            <a:avLst/>
+          </a:prstGeom>
+        </p:spPr>
+        <p:txBody>
+          <a:bodyPr rtlCol="0">
+            <a:spAutoFit/>
+          </a:bodyPr>
+          <a:lstStyle/>
+          <a:p>
+            <a:r>
+              <a:rPr lang="en-US" sz="2400" dirty="0">
+                <a:solidFill>
+                  <a:srgbClr val="002060"/>
+                </a:solidFill>
+              </a:rPr>
+              <a:t>The </a:t>
+            </a:r>
+            <a:r>
+              <a:rPr lang="en-US" sz="2400" dirty="0" err="1">
+                <a:solidFill>
+                  <a:srgbClr val="002060"/>
+                </a:solidFill>
+              </a:rPr>
+              <a:t>TVShow</a:t>
+            </a:r>
+            <a:r>
+              <a:rPr lang="en-US" sz="2400" dirty="0">
+                <a:solidFill>
+                  <a:srgbClr val="002060"/>
+                </a:solidFill>
+              </a:rPr>
+              <a:t> class (</a:t>
+            </a:r>
+            <a:r>
+              <a:rPr lang="en-US" sz="2400" dirty="0" err="1">
+                <a:solidFill>
+                  <a:srgbClr val="002060"/>
+                </a:solidFill>
+              </a:rPr>
+              <a:t>pg</a:t>
+            </a:r>
+            <a:r>
+              <a:rPr lang="en-US" sz="2400" dirty="0">
+                <a:solidFill>
+                  <a:srgbClr val="002060"/>
+                </a:solidFill>
+              </a:rPr>
+              <a:t> 5):</a:t>
+            </a:r>
+          </a:p>
+        </p:txBody>
+      </p:sp>
+      <p:sp>
+        <p:nvSpPr>
+          <p:cNvPr id="3" name="TextBox 2">
+            <a:extLst>
+              <a:ext uri="{FF2B5EF4-FFF2-40B4-BE49-F238E27FC236}">
+                <a16:creationId xmlns:a16="http://schemas.microsoft.com/office/drawing/2014/main" xmlns="" id="{EC931DCA-4690-4B93-9419-BA902293A61A}"/>
+              </a:ext>
+            </a:extLst>
+          </p:cNvPr>
+          <p:cNvSpPr txBox="1"/>
+          <p:nvPr/>
+        </p:nvSpPr>
+        <p:spPr>
+          <a:xfrm>
+            <a:off x="-183806" y="568895"/>
+            <a:ext cx="8943940" cy="5170646"/>
+          </a:xfrm>
+          <a:prstGeom prst="rect">
+            <a:avLst/>
+          </a:prstGeom>
+        </p:spPr>
+        <p:txBody>
+          <a:bodyPr wrap="square" rtlCol="0">
+            <a:spAutoFit/>
+          </a:bodyPr>
+          <a:lstStyle/>
+          <a:p>
+            <a:pPr marL="914400" lvl="1" indent="-457200">
+              <a:buFont typeface="+mj-lt"/>
+              <a:buAutoNum type="arabicPeriod" startAt="3"/>
+            </a:pPr>
+            <a:r>
+              <a:rPr lang="en-US" sz="2200" dirty="0"/>
+              <a:t>One constructor: </a:t>
+            </a:r>
+          </a:p>
+          <a:p>
+            <a:pPr marL="1371600" lvl="2" indent="-457200">
+              <a:buFont typeface="Arial" panose="020B0604020202020204" pitchFamily="34" charset="0"/>
+              <a:buChar char="•"/>
+            </a:pPr>
+            <a:r>
+              <a:rPr lang="en-US" sz="2200" dirty="0"/>
+              <a:t>Argument: </a:t>
+            </a:r>
+            <a:r>
+              <a:rPr lang="en-US" sz="2200" dirty="0" err="1"/>
+              <a:t>filepath</a:t>
+            </a:r>
+            <a:r>
+              <a:rPr lang="en-US" sz="2200" dirty="0"/>
+              <a:t> of text file containing info about a TV Show (see appendices D and E).</a:t>
+            </a:r>
+          </a:p>
+          <a:p>
+            <a:pPr marL="1371600" lvl="2" indent="-457200">
+              <a:buFont typeface="Arial" panose="020B0604020202020204" pitchFamily="34" charset="0"/>
+              <a:buChar char="•"/>
+            </a:pPr>
+            <a:r>
+              <a:rPr lang="en-US" sz="2200" dirty="0"/>
+              <a:t>The constructor will read in the file, which will contain info needed to fill in the class fields (those specific to </a:t>
+            </a:r>
+            <a:r>
+              <a:rPr lang="en-US" sz="2200" dirty="0" err="1"/>
+              <a:t>TVShow</a:t>
+            </a:r>
+            <a:r>
+              <a:rPr lang="en-US" sz="2200" dirty="0"/>
+              <a:t>, and those inherited from the </a:t>
+            </a:r>
+            <a:r>
+              <a:rPr lang="en-US" sz="2200" dirty="0" err="1"/>
+              <a:t>StreamingVideo</a:t>
+            </a:r>
+            <a:r>
+              <a:rPr lang="en-US" sz="2200" dirty="0"/>
+              <a:t> superclass).</a:t>
+            </a:r>
+          </a:p>
+          <a:p>
+            <a:pPr marL="1828800" lvl="3" indent="-457200">
+              <a:buFont typeface="Arial" panose="020B0604020202020204" pitchFamily="34" charset="0"/>
+              <a:buChar char="•"/>
+            </a:pPr>
+            <a:r>
+              <a:rPr lang="en-US" sz="2200" dirty="0">
+                <a:solidFill>
+                  <a:schemeClr val="bg1">
+                    <a:lumMod val="50000"/>
+                  </a:schemeClr>
+                </a:solidFill>
+              </a:rPr>
+              <a:t>This is a little more complex of a process then is involved for the Movie class (see later slides).</a:t>
+            </a:r>
+          </a:p>
+          <a:p>
+            <a:pPr marL="1828800" lvl="3" indent="-457200">
+              <a:buFont typeface="Arial" panose="020B0604020202020204" pitchFamily="34" charset="0"/>
+              <a:buChar char="•"/>
+            </a:pPr>
+            <a:endParaRPr lang="en-US" sz="2200" dirty="0">
+              <a:solidFill>
+                <a:schemeClr val="bg1">
+                  <a:lumMod val="50000"/>
+                </a:schemeClr>
+              </a:solidFill>
+            </a:endParaRPr>
+          </a:p>
+          <a:p>
+            <a:pPr marL="914400" lvl="1" indent="-457200">
+              <a:buFont typeface="+mj-lt"/>
+              <a:buAutoNum type="arabicPeriod" startAt="3"/>
+            </a:pPr>
+            <a:r>
+              <a:rPr lang="en-US" sz="2200" dirty="0"/>
+              <a:t>A </a:t>
+            </a:r>
+            <a:r>
+              <a:rPr lang="en-US" sz="2200" dirty="0" err="1"/>
+              <a:t>toString</a:t>
+            </a:r>
+            <a:r>
+              <a:rPr lang="en-US" sz="2200" dirty="0"/>
+              <a:t>() method: Will use StringBuilder to create a string that will be later used by </a:t>
+            </a:r>
+            <a:r>
+              <a:rPr lang="en-US" sz="2200" dirty="0" err="1"/>
+              <a:t>JOptionPane</a:t>
+            </a:r>
+            <a:r>
+              <a:rPr lang="en-US" sz="2200" dirty="0"/>
+              <a:t>:</a:t>
+            </a:r>
+          </a:p>
+          <a:p>
+            <a:pPr marL="457200" indent="-457200">
+              <a:buFont typeface="+mj-lt"/>
+              <a:buAutoNum type="arabicPeriod" startAt="4"/>
+            </a:pPr>
+            <a:endParaRPr lang="en-US" sz="2200" dirty="0">
+              <a:solidFill>
+                <a:schemeClr val="bg1">
+                  <a:lumMod val="50000"/>
+                </a:schemeClr>
+              </a:solidFill>
+            </a:endParaRPr>
+          </a:p>
+          <a:p>
+            <a:pPr marL="1828800" lvl="3" indent="-457200">
+              <a:buFont typeface="Arial" panose="020B0604020202020204" pitchFamily="34" charset="0"/>
+              <a:buChar char="•"/>
+            </a:pPr>
+            <a:endParaRPr lang="en-US" sz="2200" dirty="0">
+              <a:solidFill>
+                <a:schemeClr val="bg1">
+                  <a:lumMod val="50000"/>
+                </a:schemeClr>
+              </a:solidFill>
+            </a:endParaRPr>
+          </a:p>
+          <a:p>
+            <a:pPr lvl="3"/>
+            <a:endParaRPr lang="en-US" sz="2200" dirty="0"/>
+          </a:p>
+          <a:p>
+            <a:pPr marL="914400" lvl="1" indent="-457200">
+              <a:buFont typeface="+mj-lt"/>
+              <a:buAutoNum type="arabicPeriod" startAt="3"/>
+            </a:pPr>
+            <a:endParaRPr lang="en-US" sz="2200" dirty="0"/>
+          </a:p>
+        </p:txBody>
+      </p:sp>
+      <p:pic>
+        <p:nvPicPr>
+          <p:cNvPr id="4" name="Picture 3">
+            <a:extLst>
+              <a:ext uri="{FF2B5EF4-FFF2-40B4-BE49-F238E27FC236}">
+                <a16:creationId xmlns:a16="http://schemas.microsoft.com/office/drawing/2014/main" xmlns="" id="{FB6161B1-A1BF-4B0B-9311-229788109A6B}"/>
+              </a:ext>
+            </a:extLst>
+          </p:cNvPr>
+          <p:cNvPicPr>
+            <a:picLocks noChangeAspect="1"/>
+          </p:cNvPicPr>
+          <p:nvPr/>
+        </p:nvPicPr>
+        <p:blipFill rotWithShape="1">
+          <a:blip r:embed="rId2"/>
+          <a:srcRect l="-193" r="46839" b="41756"/>
+          <a:stretch/>
+        </p:blipFill>
+        <p:spPr>
+          <a:xfrm>
+            <a:off x="5502607" y="3980299"/>
+            <a:ext cx="2743200" cy="2662955"/>
+          </a:xfrm>
+          <a:prstGeom prst="rect">
+            <a:avLst/>
+          </a:prstGeom>
+        </p:spPr>
+      </p:pic>
+    </p:spTree>
+    <p:extLst>
+      <p:ext uri="{BB962C8B-B14F-4D97-AF65-F5344CB8AC3E}">
+        <p14:creationId xmlns:p14="http://schemas.microsoft.com/office/powerpoint/2010/main" val="1388917208"/>
+      </p:ext>
+    </p:extLst>
+  </p:cSld>
+  <p:clrMapOvr>
+    <a:masterClrMapping/>
+  </p:clrMapOvr>
+  <p:timing>
+    <p:tnLst>
+      <p:par>
+        <p:cTn id="1" dur="indefinite" restart="never" nodeType="tmRoot"/>
+      </p:par>
+    </p:tnLst>
+  </p:timing>
+</p:sld>
+</file>
+
+<file path=ppt/slides/slide9.xml><?xml version="1.0" encoding="utf-8"?>
+<p:sld xmlns:a="http://schemas.openxmlformats.org/drawingml/2006/main" xmlns:r="http://schemas.openxmlformats.org/officeDocument/2006/relationships" xmlns:p="http://schemas.openxmlformats.org/presentationml/2006/main">
+  <p:cSld>
+    <p:spTree>
+      <p:nvGrpSpPr>
+        <p:cNvPr id="1" name=""/>
+        <p:cNvGrpSpPr/>
+        <p:nvPr/>
+      </p:nvGrpSpPr>
+      <p:grpSpPr>
+        <a:xfrm>
+          <a:off x="0" y="0"/>
+          <a:ext cx="0" cy="0"/>
+          <a:chOff x="0" y="0"/>
+          <a:chExt cx="0" cy="0"/>
+        </a:xfrm>
+      </p:grpSpPr>
+      <p:sp>
+        <p:nvSpPr>
+          <p:cNvPr id="2" name="TextBox 1">
+            <a:extLst>
+              <a:ext uri="{FF2B5EF4-FFF2-40B4-BE49-F238E27FC236}">
+                <a16:creationId xmlns:a16="http://schemas.microsoft.com/office/drawing/2014/main" xmlns="" id="{8A67A37A-C488-40D7-A088-6774405888BB}"/>
+              </a:ext>
+            </a:extLst>
+          </p:cNvPr>
+          <p:cNvSpPr txBox="1"/>
+          <p:nvPr/>
+        </p:nvSpPr>
+        <p:spPr>
+          <a:xfrm>
+            <a:off x="0" y="0"/>
+            <a:ext cx="8720254" cy="461665"/>
+          </a:xfrm>
+          <a:prstGeom prst="rect">
+            <a:avLst/>
+          </a:prstGeom>
+        </p:spPr>
+        <p:txBody>
+          <a:bodyPr wrap="square" rtlCol="0">
+            <a:spAutoFit/>
+          </a:bodyPr>
+          <a:lstStyle/>
+          <a:p>
+            <a:r>
+              <a:rPr lang="en-US" sz="2400" dirty="0">
+                <a:solidFill>
+                  <a:srgbClr val="002060"/>
+                </a:solidFill>
+              </a:rPr>
+              <a:t>The </a:t>
+            </a:r>
+            <a:r>
+              <a:rPr lang="en-US" sz="2400" dirty="0" err="1">
+                <a:solidFill>
+                  <a:srgbClr val="002060"/>
+                </a:solidFill>
+              </a:rPr>
+              <a:t>TVShow</a:t>
+            </a:r>
+            <a:r>
+              <a:rPr lang="en-US" sz="2400" dirty="0">
+                <a:solidFill>
+                  <a:srgbClr val="002060"/>
+                </a:solidFill>
+              </a:rPr>
+              <a:t> class: top part of example file for a tv show (The Office)</a:t>
+            </a:r>
+          </a:p>
+        </p:txBody>
+      </p:sp>
+      <p:pic>
+        <p:nvPicPr>
+          <p:cNvPr id="9" name="Picture 8" descr="A screenshot of a computer&#10;&#10;Description automatically generated">
+            <a:extLst>
+              <a:ext uri="{FF2B5EF4-FFF2-40B4-BE49-F238E27FC236}">
+                <a16:creationId xmlns:a16="http://schemas.microsoft.com/office/drawing/2014/main" xmlns="" id="{08CDB5DC-F80B-4A62-89F1-F8F0A78F5A04}"/>
+              </a:ext>
+            </a:extLst>
+          </p:cNvPr>
+          <p:cNvPicPr>
+            <a:picLocks noChangeAspect="1"/>
+          </p:cNvPicPr>
+          <p:nvPr/>
+        </p:nvPicPr>
+        <p:blipFill rotWithShape="1">
+          <a:blip r:embed="rId2">
+            <a:extLst>
+              <a:ext uri="{28A0092B-C50C-407E-A947-70E740481C1C}">
+                <a14:useLocalDpi xmlns:a14="http://schemas.microsoft.com/office/drawing/2010/main" val="0"/>
+              </a:ext>
+            </a:extLst>
+          </a:blip>
+          <a:srcRect l="848" t="10954" r="4158" b="4732"/>
+          <a:stretch/>
+        </p:blipFill>
+        <p:spPr>
+          <a:xfrm>
+            <a:off x="78059" y="616233"/>
+            <a:ext cx="8642195" cy="5742879"/>
+          </a:xfrm>
+          <a:prstGeom prst="rect">
+            <a:avLst/>
+          </a:prstGeom>
+        </p:spPr>
+      </p:pic>
+      <p:cxnSp>
+        <p:nvCxnSpPr>
+          <p:cNvPr id="11" name="Straight Arrow Connector 10">
+            <a:extLst>
+              <a:ext uri="{FF2B5EF4-FFF2-40B4-BE49-F238E27FC236}">
+                <a16:creationId xmlns:a16="http://schemas.microsoft.com/office/drawing/2014/main" xmlns="" id="{EA3164FF-5AE1-4959-AB1F-478616A5CDD0}"/>
+              </a:ext>
+            </a:extLst>
+          </p:cNvPr>
+          <p:cNvCxnSpPr/>
+          <p:nvPr/>
+        </p:nvCxnSpPr>
+        <p:spPr>
+          <a:xfrm flipH="1">
+            <a:off x="1994747" y="1731199"/>
+            <a:ext cx="713678" cy="0"/>
+          </a:xfrm>
+          <a:prstGeom prst="straightConnector1">
+            <a:avLst/>
+          </a:prstGeom>
+          <a:ln w="38100">
+            <a:tailEnd type="triangle"/>
+          </a:ln>
+        </p:spPr>
+        <p:style>
+          <a:lnRef idx="1">
+            <a:schemeClr val="accent6"/>
+          </a:lnRef>
+          <a:fillRef idx="0">
+            <a:schemeClr val="accent6"/>
+          </a:fillRef>
+          <a:effectRef idx="0">
+            <a:schemeClr val="accent6"/>
+          </a:effectRef>
+          <a:fontRef idx="minor">
+            <a:schemeClr val="tx1"/>
+          </a:fontRef>
+        </p:style>
+      </p:cxnSp>
+      <p:pic>
+        <p:nvPicPr>
+          <p:cNvPr id="13" name="Picture 12">
+            <a:extLst>
+              <a:ext uri="{FF2B5EF4-FFF2-40B4-BE49-F238E27FC236}">
+                <a16:creationId xmlns:a16="http://schemas.microsoft.com/office/drawing/2014/main" xmlns="" id="{FBCF706F-0430-4BFB-BC8A-5620757460CF}"/>
+              </a:ext>
+            </a:extLst>
+          </p:cNvPr>
+          <p:cNvPicPr>
+            <a:picLocks noChangeAspect="1"/>
+          </p:cNvPicPr>
+          <p:nvPr/>
+        </p:nvPicPr>
+        <p:blipFill>
+          <a:blip r:embed="rId3"/>
+          <a:stretch>
+            <a:fillRect/>
+          </a:stretch>
+        </p:blipFill>
+        <p:spPr>
+          <a:xfrm>
+            <a:off x="2798955" y="1790883"/>
+            <a:ext cx="5852160" cy="1676645"/>
+          </a:xfrm>
+          <a:prstGeom prst="rect">
+            <a:avLst/>
+          </a:prstGeom>
+        </p:spPr>
+      </p:pic>
+      <p:cxnSp>
+        <p:nvCxnSpPr>
+          <p:cNvPr id="4" name="Straight Arrow Connector 3"/>
+          <p:cNvCxnSpPr/>
+          <p:nvPr/>
+        </p:nvCxnSpPr>
+        <p:spPr>
+          <a:xfrm flipH="1">
+            <a:off x="4360127" y="2432482"/>
+            <a:ext cx="309526" cy="5363"/>
+          </a:xfrm>
+          <a:prstGeom prst="straightConnector1">
+            <a:avLst/>
+          </a:prstGeom>
+          <a:ln>
+            <a:tailEnd type="triangle"/>
+          </a:ln>
+        </p:spPr>
+        <p:style>
+          <a:lnRef idx="1">
+            <a:schemeClr val="accent1"/>
+          </a:lnRef>
+          <a:fillRef idx="0">
+            <a:schemeClr val="accent1"/>
+          </a:fillRef>
+          <a:effectRef idx="0">
+            <a:schemeClr val="accent1"/>
+          </a:effectRef>
+          <a:fontRef idx="minor">
+            <a:schemeClr val="tx1"/>
+          </a:fontRef>
+        </p:style>
+      </p:cxnSp>
+      <p:sp>
+        <p:nvSpPr>
+          <p:cNvPr id="12" name="TextBox 11"/>
+          <p:cNvSpPr txBox="1"/>
+          <p:nvPr/>
+        </p:nvSpPr>
+        <p:spPr>
+          <a:xfrm>
+            <a:off x="4634141" y="2317071"/>
+            <a:ext cx="4252407" cy="246221"/>
+          </a:xfrm>
+          <a:prstGeom prst="rect">
+            <a:avLst/>
+          </a:prstGeom>
+          <a:noFill/>
+        </p:spPr>
+        <p:txBody>
+          <a:bodyPr wrap="square" rtlCol="0">
+            <a:spAutoFit/>
+          </a:bodyPr>
+          <a:lstStyle/>
+          <a:p>
+            <a:r>
+              <a:rPr lang="en-US" sz="1000" dirty="0" smtClean="0">
+                <a:solidFill>
+                  <a:srgbClr val="0070C0"/>
+                </a:solidFill>
+              </a:rPr>
+              <a:t>You could consider using a for loop for this, since you know the # of seasons</a:t>
+            </a:r>
+            <a:endParaRPr lang="en-US" sz="1000" dirty="0">
+              <a:solidFill>
+                <a:srgbClr val="0070C0"/>
+              </a:solidFill>
+            </a:endParaRPr>
+          </a:p>
+        </p:txBody>
+      </p:sp>
+      <p:sp>
+        <p:nvSpPr>
+          <p:cNvPr id="14" name="TextBox 13"/>
+          <p:cNvSpPr txBox="1"/>
+          <p:nvPr/>
+        </p:nvSpPr>
+        <p:spPr>
+          <a:xfrm>
+            <a:off x="3268295" y="3487673"/>
+            <a:ext cx="4503029" cy="400110"/>
+          </a:xfrm>
+          <a:prstGeom prst="rect">
+            <a:avLst/>
+          </a:prstGeom>
+          <a:noFill/>
+        </p:spPr>
+        <p:txBody>
+          <a:bodyPr wrap="square" rtlCol="0">
+            <a:spAutoFit/>
+          </a:bodyPr>
+          <a:lstStyle/>
+          <a:p>
+            <a:r>
+              <a:rPr lang="en-US" sz="1000" dirty="0" smtClean="0">
+                <a:solidFill>
+                  <a:srgbClr val="0070C0"/>
+                </a:solidFill>
+              </a:rPr>
+              <a:t>You could consider using a while loop for this, since you do not know the # of episodes until you’ve read through the subsequent lines of the file</a:t>
+            </a:r>
+            <a:endParaRPr lang="en-US" sz="1000" dirty="0">
+              <a:solidFill>
+                <a:srgbClr val="0070C0"/>
+              </a:solidFill>
+            </a:endParaRPr>
+          </a:p>
+        </p:txBody>
+      </p:sp>
+      <p:cxnSp>
+        <p:nvCxnSpPr>
+          <p:cNvPr id="15" name="Straight Arrow Connector 14"/>
+          <p:cNvCxnSpPr/>
+          <p:nvPr/>
+        </p:nvCxnSpPr>
+        <p:spPr>
+          <a:xfrm flipV="1">
+            <a:off x="7445404" y="3097513"/>
+            <a:ext cx="821404" cy="510935"/>
+          </a:xfrm>
+          <a:prstGeom prst="straightConnector1">
+            <a:avLst/>
+          </a:prstGeom>
+          <a:ln w="9525">
+            <a:tailEnd type="triangle"/>
+          </a:ln>
+        </p:spPr>
+        <p:style>
+          <a:lnRef idx="1">
+            <a:schemeClr val="accent1"/>
+          </a:lnRef>
+          <a:fillRef idx="0">
+            <a:schemeClr val="accent1"/>
+          </a:fillRef>
+          <a:effectRef idx="0">
+            <a:schemeClr val="accent1"/>
+          </a:effectRef>
+          <a:fontRef idx="minor">
+            <a:schemeClr val="tx1"/>
+          </a:fontRef>
+        </p:style>
+      </p:cxnSp>
+      <p:sp>
+        <p:nvSpPr>
+          <p:cNvPr id="18" name="TextBox 17"/>
+          <p:cNvSpPr txBox="1"/>
+          <p:nvPr/>
+        </p:nvSpPr>
+        <p:spPr>
+          <a:xfrm>
+            <a:off x="4442155" y="2457990"/>
+            <a:ext cx="4252407" cy="246221"/>
+          </a:xfrm>
+          <a:prstGeom prst="rect">
+            <a:avLst/>
+          </a:prstGeom>
+          <a:noFill/>
+        </p:spPr>
+        <p:txBody>
+          <a:bodyPr wrap="square" rtlCol="0">
+            <a:spAutoFit/>
+          </a:bodyPr>
+          <a:lstStyle/>
+          <a:p>
+            <a:r>
+              <a:rPr lang="en-US" sz="1000" dirty="0" smtClean="0">
+                <a:solidFill>
+                  <a:srgbClr val="0070C0"/>
+                </a:solidFill>
+                <a:sym typeface="Wingdings" panose="05000000000000000000" pitchFamily="2" charset="2"/>
+              </a:rPr>
+              <a:t> Described on next slide</a:t>
+            </a:r>
+            <a:endParaRPr lang="en-US" sz="1000" dirty="0">
+              <a:solidFill>
+                <a:srgbClr val="0070C0"/>
+              </a:solidFill>
+            </a:endParaRPr>
+          </a:p>
+        </p:txBody>
+      </p:sp>
+      <p:sp>
+        <p:nvSpPr>
+          <p:cNvPr id="19" name="TextBox 18"/>
+          <p:cNvSpPr txBox="1"/>
+          <p:nvPr/>
+        </p:nvSpPr>
+        <p:spPr>
+          <a:xfrm>
+            <a:off x="5319201" y="2755397"/>
+            <a:ext cx="4252407" cy="246221"/>
+          </a:xfrm>
+          <a:prstGeom prst="rect">
+            <a:avLst/>
+          </a:prstGeom>
+          <a:noFill/>
+        </p:spPr>
+        <p:txBody>
+          <a:bodyPr wrap="square" rtlCol="0">
+            <a:spAutoFit/>
+          </a:bodyPr>
+          <a:lstStyle/>
+          <a:p>
+            <a:r>
+              <a:rPr lang="en-US" sz="1000" dirty="0" smtClean="0">
+                <a:solidFill>
+                  <a:srgbClr val="0070C0"/>
+                </a:solidFill>
+                <a:sym typeface="Wingdings" panose="05000000000000000000" pitchFamily="2" charset="2"/>
+              </a:rPr>
+              <a:t> Episode described on a later slide</a:t>
+            </a:r>
+            <a:endParaRPr lang="en-US" sz="1000" dirty="0">
+              <a:solidFill>
+                <a:srgbClr val="0070C0"/>
+              </a:solidFill>
+            </a:endParaRPr>
+          </a:p>
+        </p:txBody>
+      </p:sp>
+      <p:graphicFrame>
+        <p:nvGraphicFramePr>
+          <p:cNvPr id="23" name="Table 22"/>
+          <p:cNvGraphicFramePr>
+            <a:graphicFrameLocks noGrp="1"/>
+          </p:cNvGraphicFramePr>
+          <p:nvPr>
+            <p:extLst>
+              <p:ext uri="{D42A27DB-BD31-4B8C-83A1-F6EECF244321}">
+                <p14:modId xmlns:p14="http://schemas.microsoft.com/office/powerpoint/2010/main" val="1728483742"/>
+              </p:ext>
+            </p:extLst>
+          </p:nvPr>
+        </p:nvGraphicFramePr>
+        <p:xfrm>
+          <a:off x="3774980" y="3960601"/>
+          <a:ext cx="1277966" cy="1174646"/>
+        </p:xfrm>
+        <a:graphic>
+          <a:graphicData uri="http://schemas.openxmlformats.org/drawingml/2006/table">
+            <a:tbl>
+              <a:tblPr firstRow="1" bandRow="1">
+                <a:tableStyleId>{5940675A-B579-460E-94D1-54222C63F5DA}</a:tableStyleId>
+              </a:tblPr>
+              <a:tblGrid>
+                <a:gridCol w="1277966"/>
+              </a:tblGrid>
+              <a:tr h="283814">
+                <a:tc>
+                  <a:txBody>
+                    <a:bodyPr/>
+                    <a:lstStyle/>
+                    <a:p>
+                      <a:r>
+                        <a:rPr lang="en-US" sz="1000" b="1" dirty="0" err="1" smtClean="0">
+                          <a:solidFill>
+                            <a:schemeClr val="bg1"/>
+                          </a:solidFill>
+                        </a:rPr>
+                        <a:t>list</a:t>
+                      </a:r>
+                      <a:r>
+                        <a:rPr lang="en-US" sz="1000" b="1" baseline="0" dirty="0" err="1" smtClean="0">
+                          <a:solidFill>
+                            <a:schemeClr val="bg1"/>
+                          </a:solidFill>
+                        </a:rPr>
+                        <a:t>OfSeasons</a:t>
+                      </a:r>
+                      <a:endParaRPr lang="en-US" sz="1000" b="1" dirty="0">
+                        <a:solidFill>
+                          <a:schemeClr val="bg1"/>
+                        </a:solidFill>
+                      </a:endParaRPr>
+                    </a:p>
+                  </a:txBody>
+                  <a:tcPr>
+                    <a:lnL w="12700" cap="flat" cmpd="sng" algn="ctr">
+                      <a:solidFill>
+                        <a:schemeClr val="bg1"/>
+                      </a:solidFill>
+                      <a:prstDash val="solid"/>
+                      <a:round/>
+                      <a:headEnd type="none" w="med" len="med"/>
+                      <a:tailEnd type="none" w="med" len="med"/>
+                    </a:lnL>
+                    <a:lnR w="12700" cap="flat" cmpd="sng" algn="ctr">
+                      <a:solidFill>
+                        <a:schemeClr val="bg1"/>
+                      </a:solidFill>
+                      <a:prstDash val="solid"/>
+                      <a:round/>
+                      <a:headEnd type="none" w="med" len="med"/>
+                      <a:tailEnd type="none" w="med" len="med"/>
+                    </a:lnR>
+                    <a:lnT w="12700" cap="flat" cmpd="sng" algn="ctr">
+                      <a:solidFill>
+                        <a:schemeClr val="bg1"/>
+                      </a:solidFill>
+                      <a:prstDash val="solid"/>
+                      <a:round/>
+                      <a:headEnd type="none" w="med" len="med"/>
+                      <a:tailEnd type="none" w="med" len="med"/>
+                    </a:lnT>
+                    <a:lnB w="12700" cap="flat" cmpd="sng" algn="ctr">
+                      <a:solidFill>
+                        <a:schemeClr val="bg1"/>
+                      </a:solidFill>
+                      <a:prstDash val="solid"/>
+                      <a:round/>
+                      <a:headEnd type="none" w="med" len="med"/>
+                      <a:tailEnd type="none" w="med" len="med"/>
+                    </a:lnB>
+                    <a:lnTlToBr w="12700" cmpd="sng">
+                      <a:noFill/>
+                      <a:prstDash val="solid"/>
+                    </a:lnTlToBr>
+                    <a:lnBlToTr w="12700" cmpd="sng">
+                      <a:noFill/>
+                      <a:prstDash val="solid"/>
+                    </a:lnBlToTr>
+                  </a:tcPr>
+                </a:tc>
+              </a:tr>
+              <a:tr h="296944">
+                <a:tc>
+                  <a:txBody>
+                    <a:bodyPr/>
+                    <a:lstStyle/>
+                    <a:p>
+                      <a:r>
+                        <a:rPr lang="en-US" sz="1000" dirty="0" smtClean="0">
+                          <a:solidFill>
+                            <a:schemeClr val="bg1"/>
+                          </a:solidFill>
+                        </a:rPr>
+                        <a:t>(0): Season</a:t>
+                      </a:r>
+                      <a:r>
+                        <a:rPr lang="en-US" sz="1000" baseline="0" dirty="0" smtClean="0">
+                          <a:solidFill>
+                            <a:schemeClr val="bg1"/>
+                          </a:solidFill>
+                        </a:rPr>
+                        <a:t> #1 object</a:t>
+                      </a:r>
+                      <a:endParaRPr lang="en-US" sz="1000" dirty="0">
+                        <a:solidFill>
+                          <a:schemeClr val="bg1"/>
+                        </a:solidFill>
+                      </a:endParaRPr>
+                    </a:p>
+                  </a:txBody>
+                  <a:tcPr>
+                    <a:lnL w="12700" cap="flat" cmpd="sng" algn="ctr">
+                      <a:solidFill>
+                        <a:schemeClr val="bg1"/>
+                      </a:solidFill>
+                      <a:prstDash val="solid"/>
+                      <a:round/>
+                      <a:headEnd type="none" w="med" len="med"/>
+                      <a:tailEnd type="none" w="med" len="med"/>
+                    </a:lnL>
+                    <a:lnR w="12700" cap="flat" cmpd="sng" algn="ctr">
+                      <a:solidFill>
+                        <a:schemeClr val="bg1"/>
+                      </a:solidFill>
+                      <a:prstDash val="solid"/>
+                      <a:round/>
+                      <a:headEnd type="none" w="med" len="med"/>
+                      <a:tailEnd type="none" w="med" len="med"/>
+                    </a:lnR>
+                    <a:lnT w="12700" cap="flat" cmpd="sng" algn="ctr">
+                      <a:solidFill>
+                        <a:schemeClr val="bg1"/>
+                      </a:solidFill>
+                      <a:prstDash val="solid"/>
+                      <a:round/>
+                      <a:headEnd type="none" w="med" len="med"/>
+                      <a:tailEnd type="none" w="med" len="med"/>
+                    </a:lnT>
+                    <a:lnB w="12700" cap="flat" cmpd="sng" algn="ctr">
+                      <a:solidFill>
+                        <a:schemeClr val="bg1"/>
+                      </a:solidFill>
+                      <a:prstDash val="solid"/>
+                      <a:round/>
+                      <a:headEnd type="none" w="med" len="med"/>
+                      <a:tailEnd type="none" w="med" len="med"/>
+                    </a:lnB>
+                    <a:lnTlToBr w="12700" cmpd="sng">
+                      <a:noFill/>
+                      <a:prstDash val="solid"/>
+                    </a:lnTlToBr>
+                    <a:lnBlToTr w="12700" cmpd="sng">
+                      <a:noFill/>
+                      <a:prstDash val="solid"/>
+                    </a:lnBlToTr>
+                  </a:tcPr>
+                </a:tc>
+              </a:tr>
+              <a:tr h="296944">
+                <a:tc>
+                  <a:txBody>
+                    <a:bodyPr/>
+                    <a:lstStyle/>
+                    <a:p>
+                      <a:r>
+                        <a:rPr lang="en-US" sz="1000" dirty="0" smtClean="0">
+                          <a:solidFill>
+                            <a:schemeClr val="bg1"/>
+                          </a:solidFill>
+                        </a:rPr>
+                        <a:t>(1)</a:t>
+                      </a:r>
+                      <a:r>
+                        <a:rPr lang="en-US" sz="1000" baseline="0" dirty="0" smtClean="0">
+                          <a:solidFill>
+                            <a:schemeClr val="bg1"/>
+                          </a:solidFill>
+                        </a:rPr>
+                        <a:t>: Season #2 object</a:t>
+                      </a:r>
+                      <a:endParaRPr lang="en-US" sz="1000" dirty="0">
+                        <a:solidFill>
+                          <a:schemeClr val="bg1"/>
+                        </a:solidFill>
+                      </a:endParaRPr>
+                    </a:p>
+                  </a:txBody>
+                  <a:tcPr>
+                    <a:lnL w="12700" cap="flat" cmpd="sng" algn="ctr">
+                      <a:solidFill>
+                        <a:schemeClr val="bg1"/>
+                      </a:solidFill>
+                      <a:prstDash val="solid"/>
+                      <a:round/>
+                      <a:headEnd type="none" w="med" len="med"/>
+                      <a:tailEnd type="none" w="med" len="med"/>
+                    </a:lnL>
+                    <a:lnR w="12700" cap="flat" cmpd="sng" algn="ctr">
+                      <a:solidFill>
+                        <a:schemeClr val="bg1"/>
+                      </a:solidFill>
+                      <a:prstDash val="solid"/>
+                      <a:round/>
+                      <a:headEnd type="none" w="med" len="med"/>
+                      <a:tailEnd type="none" w="med" len="med"/>
+                    </a:lnR>
+                    <a:lnT w="12700" cap="flat" cmpd="sng" algn="ctr">
+                      <a:solidFill>
+                        <a:schemeClr val="bg1"/>
+                      </a:solidFill>
+                      <a:prstDash val="solid"/>
+                      <a:round/>
+                      <a:headEnd type="none" w="med" len="med"/>
+                      <a:tailEnd type="none" w="med" len="med"/>
+                    </a:lnT>
+                    <a:lnB w="12700" cap="flat" cmpd="sng" algn="ctr">
+                      <a:solidFill>
+                        <a:schemeClr val="bg1"/>
+                      </a:solidFill>
+                      <a:prstDash val="solid"/>
+                      <a:round/>
+                      <a:headEnd type="none" w="med" len="med"/>
+                      <a:tailEnd type="none" w="med" len="med"/>
+                    </a:lnB>
+                    <a:lnTlToBr w="12700" cmpd="sng">
+                      <a:noFill/>
+                      <a:prstDash val="solid"/>
+                    </a:lnTlToBr>
+                    <a:lnBlToTr w="12700" cmpd="sng">
+                      <a:noFill/>
+                      <a:prstDash val="solid"/>
+                    </a:lnBlToTr>
+                  </a:tcPr>
+                </a:tc>
+              </a:tr>
+              <a:tr h="296944">
+                <a:tc>
+                  <a:txBody>
+                    <a:bodyPr/>
+                    <a:lstStyle/>
+                    <a:p>
+                      <a:r>
+                        <a:rPr lang="en-US" sz="1000" dirty="0" smtClean="0">
+                          <a:solidFill>
+                            <a:schemeClr val="bg1"/>
+                          </a:solidFill>
+                        </a:rPr>
+                        <a:t>(2): Season</a:t>
+                      </a:r>
+                      <a:r>
+                        <a:rPr lang="en-US" sz="1000" baseline="0" dirty="0" smtClean="0">
+                          <a:solidFill>
+                            <a:schemeClr val="bg1"/>
+                          </a:solidFill>
+                        </a:rPr>
+                        <a:t> #3 object</a:t>
+                      </a:r>
+                      <a:endParaRPr lang="en-US" sz="1000" dirty="0">
+                        <a:solidFill>
+                          <a:schemeClr val="bg1"/>
+                        </a:solidFill>
+                      </a:endParaRPr>
+                    </a:p>
+                  </a:txBody>
+                  <a:tcPr>
+                    <a:lnL w="12700" cap="flat" cmpd="sng" algn="ctr">
+                      <a:solidFill>
+                        <a:schemeClr val="bg1"/>
+                      </a:solidFill>
+                      <a:prstDash val="solid"/>
+                      <a:round/>
+                      <a:headEnd type="none" w="med" len="med"/>
+                      <a:tailEnd type="none" w="med" len="med"/>
+                    </a:lnL>
+                    <a:lnR w="12700" cap="flat" cmpd="sng" algn="ctr">
+                      <a:solidFill>
+                        <a:schemeClr val="bg1"/>
+                      </a:solidFill>
+                      <a:prstDash val="solid"/>
+                      <a:round/>
+                      <a:headEnd type="none" w="med" len="med"/>
+                      <a:tailEnd type="none" w="med" len="med"/>
+                    </a:lnR>
+                    <a:lnT w="12700" cap="flat" cmpd="sng" algn="ctr">
+                      <a:solidFill>
+                        <a:schemeClr val="bg1"/>
+                      </a:solidFill>
+                      <a:prstDash val="solid"/>
+                      <a:round/>
+                      <a:headEnd type="none" w="med" len="med"/>
+                      <a:tailEnd type="none" w="med" len="med"/>
+                    </a:lnT>
+                    <a:lnB w="12700" cap="flat" cmpd="sng" algn="ctr">
+                      <a:solidFill>
+                        <a:schemeClr val="bg1"/>
+                      </a:solidFill>
+                      <a:prstDash val="solid"/>
+                      <a:round/>
+                      <a:headEnd type="none" w="med" len="med"/>
+                      <a:tailEnd type="none" w="med" len="med"/>
+                    </a:lnB>
+                    <a:lnTlToBr w="12700" cmpd="sng">
+                      <a:noFill/>
+                      <a:prstDash val="solid"/>
+                    </a:lnTlToBr>
+                    <a:lnBlToTr w="12700" cmpd="sng">
+                      <a:noFill/>
+                      <a:prstDash val="solid"/>
+                    </a:lnBlToTr>
+                  </a:tcPr>
+                </a:tc>
+              </a:tr>
+            </a:tbl>
+          </a:graphicData>
+        </a:graphic>
+      </p:graphicFrame>
+      <p:cxnSp>
+        <p:nvCxnSpPr>
+          <p:cNvPr id="24" name="Straight Arrow Connector 23"/>
+          <p:cNvCxnSpPr/>
+          <p:nvPr/>
+        </p:nvCxnSpPr>
+        <p:spPr>
+          <a:xfrm flipV="1">
+            <a:off x="5109861" y="4428800"/>
+            <a:ext cx="365760" cy="22064"/>
+          </a:xfrm>
+          <a:prstGeom prst="straightConnector1">
+            <a:avLst/>
+          </a:prstGeom>
+          <a:ln w="19050">
+            <a:solidFill>
+              <a:schemeClr val="bg1"/>
+            </a:solidFill>
+            <a:tailEnd type="triangle"/>
+          </a:ln>
+        </p:spPr>
+        <p:style>
+          <a:lnRef idx="1">
+            <a:schemeClr val="accent1"/>
+          </a:lnRef>
+          <a:fillRef idx="0">
+            <a:schemeClr val="accent1"/>
+          </a:fillRef>
+          <a:effectRef idx="0">
+            <a:schemeClr val="accent1"/>
+          </a:effectRef>
+          <a:fontRef idx="minor">
+            <a:schemeClr val="tx1"/>
+          </a:fontRef>
+        </p:style>
+      </p:cxnSp>
+      <p:graphicFrame>
+        <p:nvGraphicFramePr>
+          <p:cNvPr id="31" name="Table 30"/>
+          <p:cNvGraphicFramePr>
+            <a:graphicFrameLocks noGrp="1"/>
+          </p:cNvGraphicFramePr>
+          <p:nvPr>
+            <p:extLst>
+              <p:ext uri="{D42A27DB-BD31-4B8C-83A1-F6EECF244321}">
+                <p14:modId xmlns:p14="http://schemas.microsoft.com/office/powerpoint/2010/main" val="1366375447"/>
+              </p:ext>
+            </p:extLst>
+          </p:nvPr>
+        </p:nvGraphicFramePr>
+        <p:xfrm>
+          <a:off x="5563152" y="3969122"/>
+          <a:ext cx="1577485" cy="963483"/>
+        </p:xfrm>
+        <a:graphic>
+          <a:graphicData uri="http://schemas.openxmlformats.org/drawingml/2006/table">
+            <a:tbl>
+              <a:tblPr firstRow="1" bandRow="1">
+                <a:tableStyleId>{5940675A-B579-460E-94D1-54222C63F5DA}</a:tableStyleId>
+              </a:tblPr>
+              <a:tblGrid>
+                <a:gridCol w="1577485"/>
+              </a:tblGrid>
+              <a:tr h="321161">
+                <a:tc>
+                  <a:txBody>
+                    <a:bodyPr/>
+                    <a:lstStyle/>
+                    <a:p>
+                      <a:r>
+                        <a:rPr lang="en-US" sz="1000" b="1" dirty="0" smtClean="0">
+                          <a:solidFill>
+                            <a:schemeClr val="bg1"/>
+                          </a:solidFill>
+                        </a:rPr>
+                        <a:t>Season</a:t>
+                      </a:r>
+                      <a:r>
+                        <a:rPr lang="en-US" sz="1000" b="1" baseline="0" dirty="0" smtClean="0">
+                          <a:solidFill>
+                            <a:schemeClr val="bg1"/>
+                          </a:solidFill>
+                        </a:rPr>
+                        <a:t> #1 object</a:t>
+                      </a:r>
+                      <a:endParaRPr lang="en-US" sz="1000" b="1" dirty="0">
+                        <a:solidFill>
+                          <a:schemeClr val="bg1"/>
+                        </a:solidFill>
+                      </a:endParaRPr>
+                    </a:p>
+                  </a:txBody>
+                  <a:tcPr>
+                    <a:lnL w="12700" cap="flat" cmpd="sng" algn="ctr">
+                      <a:solidFill>
+                        <a:schemeClr val="bg1"/>
+                      </a:solidFill>
+                      <a:prstDash val="solid"/>
+                      <a:round/>
+                      <a:headEnd type="none" w="med" len="med"/>
+                      <a:tailEnd type="none" w="med" len="med"/>
+                    </a:lnL>
+                    <a:lnR w="12700" cap="flat" cmpd="sng" algn="ctr">
+                      <a:solidFill>
+                        <a:schemeClr val="bg1"/>
+                      </a:solidFill>
+                      <a:prstDash val="solid"/>
+                      <a:round/>
+                      <a:headEnd type="none" w="med" len="med"/>
+                      <a:tailEnd type="none" w="med" len="med"/>
+                    </a:lnR>
+                    <a:lnT w="12700" cap="flat" cmpd="sng" algn="ctr">
+                      <a:solidFill>
+                        <a:schemeClr val="bg1"/>
+                      </a:solidFill>
+                      <a:prstDash val="solid"/>
+                      <a:round/>
+                      <a:headEnd type="none" w="med" len="med"/>
+                      <a:tailEnd type="none" w="med" len="med"/>
+                    </a:lnT>
+                    <a:lnB w="12700" cap="flat" cmpd="sng" algn="ctr">
+                      <a:solidFill>
+                        <a:schemeClr val="bg1"/>
+                      </a:solidFill>
+                      <a:prstDash val="solid"/>
+                      <a:round/>
+                      <a:headEnd type="none" w="med" len="med"/>
+                      <a:tailEnd type="none" w="med" len="med"/>
+                    </a:lnB>
+                    <a:lnTlToBr w="12700" cmpd="sng">
+                      <a:noFill/>
+                      <a:prstDash val="solid"/>
+                    </a:lnTlToBr>
+                    <a:lnBlToTr w="12700" cmpd="sng">
+                      <a:noFill/>
+                      <a:prstDash val="solid"/>
+                    </a:lnBlToTr>
+                  </a:tcPr>
+                </a:tc>
+              </a:tr>
+              <a:tr h="321161">
+                <a:tc>
+                  <a:txBody>
+                    <a:bodyPr/>
+                    <a:lstStyle/>
+                    <a:p>
+                      <a:r>
+                        <a:rPr lang="en-US" sz="1000" b="0" dirty="0" err="1" smtClean="0">
+                          <a:solidFill>
+                            <a:schemeClr val="bg1"/>
+                          </a:solidFill>
+                        </a:rPr>
+                        <a:t>seasonNumber</a:t>
+                      </a:r>
+                      <a:endParaRPr lang="en-US" sz="1000" b="0" dirty="0">
+                        <a:solidFill>
+                          <a:schemeClr val="bg1"/>
+                        </a:solidFill>
+                      </a:endParaRPr>
+                    </a:p>
+                  </a:txBody>
+                  <a:tcPr>
+                    <a:lnL w="12700" cap="flat" cmpd="sng" algn="ctr">
+                      <a:solidFill>
+                        <a:schemeClr val="bg1"/>
+                      </a:solidFill>
+                      <a:prstDash val="solid"/>
+                      <a:round/>
+                      <a:headEnd type="none" w="med" len="med"/>
+                      <a:tailEnd type="none" w="med" len="med"/>
+                    </a:lnL>
+                    <a:lnR w="12700" cap="flat" cmpd="sng" algn="ctr">
+                      <a:solidFill>
+                        <a:schemeClr val="bg1"/>
+                      </a:solidFill>
+                      <a:prstDash val="solid"/>
+                      <a:round/>
+                      <a:headEnd type="none" w="med" len="med"/>
+                      <a:tailEnd type="none" w="med" len="med"/>
+                    </a:lnR>
+                    <a:lnT w="12700" cap="flat" cmpd="sng" algn="ctr">
+                      <a:solidFill>
+                        <a:schemeClr val="bg1"/>
+                      </a:solidFill>
+                      <a:prstDash val="solid"/>
+                      <a:round/>
+                      <a:headEnd type="none" w="med" len="med"/>
+                      <a:tailEnd type="none" w="med" len="med"/>
+                    </a:lnT>
+                    <a:lnB w="12700" cap="flat" cmpd="sng" algn="ctr">
+                      <a:solidFill>
+                        <a:schemeClr val="bg1"/>
+                      </a:solidFill>
+                      <a:prstDash val="solid"/>
+                      <a:round/>
+                      <a:headEnd type="none" w="med" len="med"/>
+                      <a:tailEnd type="none" w="med" len="med"/>
+                    </a:lnB>
+                    <a:lnTlToBr w="12700" cmpd="sng">
+                      <a:noFill/>
+                      <a:prstDash val="solid"/>
+                    </a:lnTlToBr>
+                    <a:lnBlToTr w="12700" cmpd="sng">
+                      <a:noFill/>
+                      <a:prstDash val="solid"/>
+                    </a:lnBlToTr>
+                  </a:tcPr>
+                </a:tc>
+              </a:tr>
+              <a:tr h="321161">
+                <a:tc>
+                  <a:txBody>
+                    <a:bodyPr/>
+                    <a:lstStyle/>
+                    <a:p>
+                      <a:r>
+                        <a:rPr lang="en-US" sz="1000" b="0" dirty="0" err="1" smtClean="0">
+                          <a:solidFill>
+                            <a:schemeClr val="bg1"/>
+                          </a:solidFill>
+                        </a:rPr>
+                        <a:t>listOfEpisodes</a:t>
+                      </a:r>
+                      <a:endParaRPr lang="en-US" sz="1000" b="0" dirty="0">
+                        <a:solidFill>
+                          <a:schemeClr val="bg1"/>
+                        </a:solidFill>
+                      </a:endParaRPr>
+                    </a:p>
+                  </a:txBody>
+                  <a:tcPr>
+                    <a:lnL w="12700" cap="flat" cmpd="sng" algn="ctr">
+                      <a:solidFill>
+                        <a:schemeClr val="bg1"/>
+                      </a:solidFill>
+                      <a:prstDash val="solid"/>
+                      <a:round/>
+                      <a:headEnd type="none" w="med" len="med"/>
+                      <a:tailEnd type="none" w="med" len="med"/>
+                    </a:lnL>
+                    <a:lnR w="12700" cap="flat" cmpd="sng" algn="ctr">
+                      <a:solidFill>
+                        <a:schemeClr val="bg1"/>
+                      </a:solidFill>
+                      <a:prstDash val="solid"/>
+                      <a:round/>
+                      <a:headEnd type="none" w="med" len="med"/>
+                      <a:tailEnd type="none" w="med" len="med"/>
+                    </a:lnR>
+                    <a:lnT w="12700" cap="flat" cmpd="sng" algn="ctr">
+                      <a:solidFill>
+                        <a:schemeClr val="bg1"/>
+                      </a:solidFill>
+                      <a:prstDash val="solid"/>
+                      <a:round/>
+                      <a:headEnd type="none" w="med" len="med"/>
+                      <a:tailEnd type="none" w="med" len="med"/>
+                    </a:lnT>
+                    <a:lnB w="12700" cap="flat" cmpd="sng" algn="ctr">
+                      <a:solidFill>
+                        <a:schemeClr val="bg1"/>
+                      </a:solidFill>
+                      <a:prstDash val="solid"/>
+                      <a:round/>
+                      <a:headEnd type="none" w="med" len="med"/>
+                      <a:tailEnd type="none" w="med" len="med"/>
+                    </a:lnB>
+                    <a:lnTlToBr w="12700" cmpd="sng">
+                      <a:noFill/>
+                      <a:prstDash val="solid"/>
+                    </a:lnTlToBr>
+                    <a:lnBlToTr w="12700" cmpd="sng">
+                      <a:noFill/>
+                      <a:prstDash val="solid"/>
+                    </a:lnBlToTr>
+                  </a:tcPr>
+                </a:tc>
+              </a:tr>
+            </a:tbl>
+          </a:graphicData>
+        </a:graphic>
+      </p:graphicFrame>
+      <p:cxnSp>
+        <p:nvCxnSpPr>
+          <p:cNvPr id="32" name="Straight Arrow Connector 31"/>
+          <p:cNvCxnSpPr/>
+          <p:nvPr/>
+        </p:nvCxnSpPr>
+        <p:spPr>
+          <a:xfrm>
+            <a:off x="5637518" y="4800600"/>
+            <a:ext cx="76200" cy="287310"/>
+          </a:xfrm>
+          <a:prstGeom prst="straightConnector1">
+            <a:avLst/>
+          </a:prstGeom>
+          <a:ln w="19050">
+            <a:solidFill>
+              <a:schemeClr val="bg1"/>
+            </a:solidFill>
+            <a:tailEnd type="triangle"/>
+          </a:ln>
+        </p:spPr>
+        <p:style>
+          <a:lnRef idx="1">
+            <a:schemeClr val="accent1"/>
+          </a:lnRef>
+          <a:fillRef idx="0">
+            <a:schemeClr val="accent1"/>
+          </a:fillRef>
+          <a:effectRef idx="0">
+            <a:schemeClr val="accent1"/>
+          </a:effectRef>
+          <a:fontRef idx="minor">
+            <a:schemeClr val="tx1"/>
+          </a:fontRef>
+        </p:style>
+      </p:cxnSp>
+      <p:graphicFrame>
+        <p:nvGraphicFramePr>
+          <p:cNvPr id="35" name="Table 34"/>
+          <p:cNvGraphicFramePr>
+            <a:graphicFrameLocks noGrp="1"/>
+          </p:cNvGraphicFramePr>
+          <p:nvPr>
+            <p:extLst>
+              <p:ext uri="{D42A27DB-BD31-4B8C-83A1-F6EECF244321}">
+                <p14:modId xmlns:p14="http://schemas.microsoft.com/office/powerpoint/2010/main" val="2325514169"/>
+              </p:ext>
+            </p:extLst>
+          </p:nvPr>
+        </p:nvGraphicFramePr>
+        <p:xfrm>
+          <a:off x="5078657" y="5105400"/>
+          <a:ext cx="1474543" cy="1178682"/>
+        </p:xfrm>
+        <a:graphic>
+          <a:graphicData uri="http://schemas.openxmlformats.org/drawingml/2006/table">
+            <a:tbl>
+              <a:tblPr firstRow="1" bandRow="1">
+                <a:tableStyleId>{5940675A-B579-460E-94D1-54222C63F5DA}</a:tableStyleId>
+              </a:tblPr>
+              <a:tblGrid>
+                <a:gridCol w="1474543"/>
+              </a:tblGrid>
+              <a:tr h="284790">
+                <a:tc>
+                  <a:txBody>
+                    <a:bodyPr/>
+                    <a:lstStyle/>
+                    <a:p>
+                      <a:r>
+                        <a:rPr lang="en-US" sz="1000" b="1" dirty="0" err="1" smtClean="0">
+                          <a:solidFill>
+                            <a:schemeClr val="bg1"/>
+                          </a:solidFill>
+                        </a:rPr>
+                        <a:t>list</a:t>
+                      </a:r>
+                      <a:r>
+                        <a:rPr lang="en-US" sz="1000" b="1" baseline="0" dirty="0" err="1" smtClean="0">
+                          <a:solidFill>
+                            <a:schemeClr val="bg1"/>
+                          </a:solidFill>
+                        </a:rPr>
+                        <a:t>OfEpisodes</a:t>
+                      </a:r>
+                      <a:endParaRPr lang="en-US" sz="1000" b="1" dirty="0">
+                        <a:solidFill>
+                          <a:schemeClr val="bg1"/>
+                        </a:solidFill>
+                      </a:endParaRPr>
+                    </a:p>
+                  </a:txBody>
+                  <a:tcPr>
+                    <a:lnL w="12700" cap="flat" cmpd="sng" algn="ctr">
+                      <a:solidFill>
+                        <a:schemeClr val="bg1"/>
+                      </a:solidFill>
+                      <a:prstDash val="solid"/>
+                      <a:round/>
+                      <a:headEnd type="none" w="med" len="med"/>
+                      <a:tailEnd type="none" w="med" len="med"/>
+                    </a:lnL>
+                    <a:lnR w="12700" cap="flat" cmpd="sng" algn="ctr">
+                      <a:solidFill>
+                        <a:schemeClr val="bg1"/>
+                      </a:solidFill>
+                      <a:prstDash val="solid"/>
+                      <a:round/>
+                      <a:headEnd type="none" w="med" len="med"/>
+                      <a:tailEnd type="none" w="med" len="med"/>
+                    </a:lnR>
+                    <a:lnT w="12700" cap="flat" cmpd="sng" algn="ctr">
+                      <a:solidFill>
+                        <a:schemeClr val="bg1"/>
+                      </a:solidFill>
+                      <a:prstDash val="solid"/>
+                      <a:round/>
+                      <a:headEnd type="none" w="med" len="med"/>
+                      <a:tailEnd type="none" w="med" len="med"/>
+                    </a:lnT>
+                    <a:lnB w="12700" cap="flat" cmpd="sng" algn="ctr">
+                      <a:solidFill>
+                        <a:schemeClr val="bg1"/>
+                      </a:solidFill>
+                      <a:prstDash val="solid"/>
+                      <a:round/>
+                      <a:headEnd type="none" w="med" len="med"/>
+                      <a:tailEnd type="none" w="med" len="med"/>
+                    </a:lnB>
+                    <a:lnTlToBr w="12700" cmpd="sng">
+                      <a:noFill/>
+                      <a:prstDash val="solid"/>
+                    </a:lnTlToBr>
+                    <a:lnBlToTr w="12700" cmpd="sng">
+                      <a:noFill/>
+                      <a:prstDash val="solid"/>
+                    </a:lnBlToTr>
+                  </a:tcPr>
+                </a:tc>
+              </a:tr>
+              <a:tr h="297964">
+                <a:tc>
+                  <a:txBody>
+                    <a:bodyPr/>
+                    <a:lstStyle/>
+                    <a:p>
+                      <a:r>
+                        <a:rPr lang="en-US" sz="1000" dirty="0" smtClean="0">
+                          <a:solidFill>
+                            <a:schemeClr val="bg1"/>
+                          </a:solidFill>
+                        </a:rPr>
+                        <a:t>(0):</a:t>
+                      </a:r>
+                      <a:r>
+                        <a:rPr lang="en-US" sz="1000" baseline="0" dirty="0" smtClean="0">
+                          <a:solidFill>
+                            <a:schemeClr val="bg1"/>
+                          </a:solidFill>
+                        </a:rPr>
+                        <a:t> Episode #1 object</a:t>
+                      </a:r>
+                      <a:endParaRPr lang="en-US" sz="1000" dirty="0">
+                        <a:solidFill>
+                          <a:schemeClr val="bg1"/>
+                        </a:solidFill>
+                      </a:endParaRPr>
+                    </a:p>
+                  </a:txBody>
+                  <a:tcPr>
+                    <a:lnL w="12700" cap="flat" cmpd="sng" algn="ctr">
+                      <a:solidFill>
+                        <a:schemeClr val="bg1"/>
+                      </a:solidFill>
+                      <a:prstDash val="solid"/>
+                      <a:round/>
+                      <a:headEnd type="none" w="med" len="med"/>
+                      <a:tailEnd type="none" w="med" len="med"/>
+                    </a:lnL>
+                    <a:lnR w="12700" cap="flat" cmpd="sng" algn="ctr">
+                      <a:solidFill>
+                        <a:schemeClr val="bg1"/>
+                      </a:solidFill>
+                      <a:prstDash val="solid"/>
+                      <a:round/>
+                      <a:headEnd type="none" w="med" len="med"/>
+                      <a:tailEnd type="none" w="med" len="med"/>
+                    </a:lnR>
+                    <a:lnT w="12700" cap="flat" cmpd="sng" algn="ctr">
+                      <a:solidFill>
+                        <a:schemeClr val="bg1"/>
+                      </a:solidFill>
+                      <a:prstDash val="solid"/>
+                      <a:round/>
+                      <a:headEnd type="none" w="med" len="med"/>
+                      <a:tailEnd type="none" w="med" len="med"/>
+                    </a:lnT>
+                    <a:lnB w="12700" cap="flat" cmpd="sng" algn="ctr">
+                      <a:solidFill>
+                        <a:schemeClr val="bg1"/>
+                      </a:solidFill>
+                      <a:prstDash val="solid"/>
+                      <a:round/>
+                      <a:headEnd type="none" w="med" len="med"/>
+                      <a:tailEnd type="none" w="med" len="med"/>
+                    </a:lnB>
+                    <a:lnTlToBr w="12700" cmpd="sng">
+                      <a:noFill/>
+                      <a:prstDash val="solid"/>
+                    </a:lnTlToBr>
+                    <a:lnBlToTr w="12700" cmpd="sng">
+                      <a:noFill/>
+                      <a:prstDash val="solid"/>
+                    </a:lnBlToTr>
+                  </a:tcPr>
+                </a:tc>
+              </a:tr>
+              <a:tr h="297964">
+                <a:tc>
+                  <a:txBody>
+                    <a:bodyPr/>
+                    <a:lstStyle/>
+                    <a:p>
+                      <a:r>
+                        <a:rPr lang="en-US" sz="1000" dirty="0" smtClean="0">
+                          <a:solidFill>
+                            <a:schemeClr val="bg1"/>
+                          </a:solidFill>
+                        </a:rPr>
+                        <a:t>(1):</a:t>
+                      </a:r>
+                      <a:r>
+                        <a:rPr lang="en-US" sz="1000" baseline="0" dirty="0" smtClean="0">
+                          <a:solidFill>
+                            <a:schemeClr val="bg1"/>
+                          </a:solidFill>
+                        </a:rPr>
+                        <a:t> Episode #2 object</a:t>
+                      </a:r>
+                      <a:endParaRPr lang="en-US" sz="1000" dirty="0">
+                        <a:solidFill>
+                          <a:schemeClr val="bg1"/>
+                        </a:solidFill>
+                      </a:endParaRPr>
+                    </a:p>
+                  </a:txBody>
+                  <a:tcPr>
+                    <a:lnL w="12700" cap="flat" cmpd="sng" algn="ctr">
+                      <a:solidFill>
+                        <a:schemeClr val="bg1"/>
+                      </a:solidFill>
+                      <a:prstDash val="solid"/>
+                      <a:round/>
+                      <a:headEnd type="none" w="med" len="med"/>
+                      <a:tailEnd type="none" w="med" len="med"/>
+                    </a:lnL>
+                    <a:lnR w="12700" cap="flat" cmpd="sng" algn="ctr">
+                      <a:solidFill>
+                        <a:schemeClr val="bg1"/>
+                      </a:solidFill>
+                      <a:prstDash val="solid"/>
+                      <a:round/>
+                      <a:headEnd type="none" w="med" len="med"/>
+                      <a:tailEnd type="none" w="med" len="med"/>
+                    </a:lnR>
+                    <a:lnT w="12700" cap="flat" cmpd="sng" algn="ctr">
+                      <a:solidFill>
+                        <a:schemeClr val="bg1"/>
+                      </a:solidFill>
+                      <a:prstDash val="solid"/>
+                      <a:round/>
+                      <a:headEnd type="none" w="med" len="med"/>
+                      <a:tailEnd type="none" w="med" len="med"/>
+                    </a:lnT>
+                    <a:lnB w="12700" cap="flat" cmpd="sng" algn="ctr">
+                      <a:solidFill>
+                        <a:schemeClr val="bg1"/>
+                      </a:solidFill>
+                      <a:prstDash val="solid"/>
+                      <a:round/>
+                      <a:headEnd type="none" w="med" len="med"/>
+                      <a:tailEnd type="none" w="med" len="med"/>
+                    </a:lnB>
+                    <a:lnTlToBr w="12700" cmpd="sng">
+                      <a:noFill/>
+                      <a:prstDash val="solid"/>
+                    </a:lnTlToBr>
+                    <a:lnBlToTr w="12700" cmpd="sng">
+                      <a:noFill/>
+                      <a:prstDash val="solid"/>
+                    </a:lnBlToTr>
+                  </a:tcPr>
+                </a:tc>
+              </a:tr>
+              <a:tr h="297964">
+                <a:tc>
+                  <a:txBody>
+                    <a:bodyPr/>
+                    <a:lstStyle/>
+                    <a:p>
+                      <a:r>
+                        <a:rPr lang="en-US" sz="1000" dirty="0" err="1" smtClean="0">
+                          <a:solidFill>
+                            <a:schemeClr val="bg1"/>
+                          </a:solidFill>
+                        </a:rPr>
+                        <a:t>etc</a:t>
+                      </a:r>
+                      <a:r>
+                        <a:rPr lang="en-US" sz="1000" dirty="0" smtClean="0">
+                          <a:solidFill>
+                            <a:schemeClr val="bg1"/>
+                          </a:solidFill>
+                        </a:rPr>
+                        <a:t>… (list</a:t>
+                      </a:r>
+                      <a:r>
+                        <a:rPr lang="en-US" sz="1000" baseline="0" dirty="0" smtClean="0">
+                          <a:solidFill>
+                            <a:schemeClr val="bg1"/>
+                          </a:solidFill>
+                        </a:rPr>
+                        <a:t> length varies)</a:t>
+                      </a:r>
+                      <a:endParaRPr lang="en-US" sz="1000" dirty="0">
+                        <a:solidFill>
+                          <a:schemeClr val="bg1"/>
+                        </a:solidFill>
+                      </a:endParaRPr>
+                    </a:p>
+                  </a:txBody>
+                  <a:tcPr>
+                    <a:lnL w="12700" cap="flat" cmpd="sng" algn="ctr">
+                      <a:solidFill>
+                        <a:schemeClr val="bg1"/>
+                      </a:solidFill>
+                      <a:prstDash val="solid"/>
+                      <a:round/>
+                      <a:headEnd type="none" w="med" len="med"/>
+                      <a:tailEnd type="none" w="med" len="med"/>
+                    </a:lnL>
+                    <a:lnR w="12700" cap="flat" cmpd="sng" algn="ctr">
+                      <a:solidFill>
+                        <a:schemeClr val="bg1"/>
+                      </a:solidFill>
+                      <a:prstDash val="solid"/>
+                      <a:round/>
+                      <a:headEnd type="none" w="med" len="med"/>
+                      <a:tailEnd type="none" w="med" len="med"/>
+                    </a:lnR>
+                    <a:lnT w="12700" cap="flat" cmpd="sng" algn="ctr">
+                      <a:solidFill>
+                        <a:schemeClr val="bg1"/>
+                      </a:solidFill>
+                      <a:prstDash val="solid"/>
+                      <a:round/>
+                      <a:headEnd type="none" w="med" len="med"/>
+                      <a:tailEnd type="none" w="med" len="med"/>
+                    </a:lnT>
+                    <a:lnB w="12700" cap="flat" cmpd="sng" algn="ctr">
+                      <a:solidFill>
+                        <a:schemeClr val="bg1"/>
+                      </a:solidFill>
+                      <a:prstDash val="solid"/>
+                      <a:round/>
+                      <a:headEnd type="none" w="med" len="med"/>
+                      <a:tailEnd type="none" w="med" len="med"/>
+                    </a:lnB>
+                    <a:lnTlToBr w="12700" cmpd="sng">
+                      <a:noFill/>
+                      <a:prstDash val="solid"/>
+                    </a:lnTlToBr>
+                    <a:lnBlToTr w="12700" cmpd="sng">
+                      <a:noFill/>
+                      <a:prstDash val="solid"/>
+                    </a:lnBlToTr>
+                  </a:tcPr>
+                </a:tc>
+              </a:tr>
+            </a:tbl>
+          </a:graphicData>
+        </a:graphic>
+      </p:graphicFrame>
+      <p:cxnSp>
+        <p:nvCxnSpPr>
+          <p:cNvPr id="36" name="Straight Arrow Connector 35"/>
+          <p:cNvCxnSpPr/>
+          <p:nvPr/>
+        </p:nvCxnSpPr>
+        <p:spPr>
+          <a:xfrm>
+            <a:off x="6497261" y="5502203"/>
+            <a:ext cx="263083" cy="0"/>
+          </a:xfrm>
+          <a:prstGeom prst="straightConnector1">
+            <a:avLst/>
+          </a:prstGeom>
+          <a:ln w="19050">
+            <a:solidFill>
+              <a:schemeClr val="bg1"/>
+            </a:solidFill>
+            <a:tailEnd type="triangle"/>
+          </a:ln>
+        </p:spPr>
+        <p:style>
+          <a:lnRef idx="1">
+            <a:schemeClr val="accent1"/>
+          </a:lnRef>
+          <a:fillRef idx="0">
+            <a:schemeClr val="accent1"/>
+          </a:fillRef>
+          <a:effectRef idx="0">
+            <a:schemeClr val="accent1"/>
+          </a:effectRef>
+          <a:fontRef idx="minor">
+            <a:schemeClr val="tx1"/>
+          </a:fontRef>
+        </p:style>
+      </p:cxnSp>
+      <p:graphicFrame>
+        <p:nvGraphicFramePr>
+          <p:cNvPr id="38" name="Table 37"/>
+          <p:cNvGraphicFramePr>
+            <a:graphicFrameLocks noGrp="1"/>
+          </p:cNvGraphicFramePr>
+          <p:nvPr>
+            <p:extLst>
+              <p:ext uri="{D42A27DB-BD31-4B8C-83A1-F6EECF244321}">
+                <p14:modId xmlns:p14="http://schemas.microsoft.com/office/powerpoint/2010/main" val="2765394662"/>
+              </p:ext>
+            </p:extLst>
+          </p:nvPr>
+        </p:nvGraphicFramePr>
+        <p:xfrm>
+          <a:off x="6818276" y="5164117"/>
+          <a:ext cx="1577485" cy="869801"/>
+        </p:xfrm>
+        <a:graphic>
+          <a:graphicData uri="http://schemas.openxmlformats.org/drawingml/2006/table">
+            <a:tbl>
+              <a:tblPr firstRow="1" bandRow="1">
+                <a:tableStyleId>{5940675A-B579-460E-94D1-54222C63F5DA}</a:tableStyleId>
+              </a:tblPr>
+              <a:tblGrid>
+                <a:gridCol w="1577485"/>
+              </a:tblGrid>
+              <a:tr h="321161">
+                <a:tc>
+                  <a:txBody>
+                    <a:bodyPr/>
+                    <a:lstStyle/>
+                    <a:p>
+                      <a:r>
+                        <a:rPr lang="en-US" sz="1000" b="1" baseline="0" dirty="0" smtClean="0">
+                          <a:solidFill>
+                            <a:schemeClr val="bg1"/>
+                          </a:solidFill>
+                        </a:rPr>
+                        <a:t>Episode #1 object</a:t>
+                      </a:r>
+                      <a:endParaRPr lang="en-US" sz="1000" b="1" dirty="0">
+                        <a:solidFill>
+                          <a:schemeClr val="bg1"/>
+                        </a:solidFill>
+                      </a:endParaRPr>
+                    </a:p>
+                  </a:txBody>
+                  <a:tcPr>
+                    <a:lnL w="12700" cap="flat" cmpd="sng" algn="ctr">
+                      <a:solidFill>
+                        <a:schemeClr val="bg1"/>
+                      </a:solidFill>
+                      <a:prstDash val="solid"/>
+                      <a:round/>
+                      <a:headEnd type="none" w="med" len="med"/>
+                      <a:tailEnd type="none" w="med" len="med"/>
+                    </a:lnL>
+                    <a:lnR w="12700" cap="flat" cmpd="sng" algn="ctr">
+                      <a:solidFill>
+                        <a:schemeClr val="bg1"/>
+                      </a:solidFill>
+                      <a:prstDash val="solid"/>
+                      <a:round/>
+                      <a:headEnd type="none" w="med" len="med"/>
+                      <a:tailEnd type="none" w="med" len="med"/>
+                    </a:lnR>
+                    <a:lnT w="12700" cap="flat" cmpd="sng" algn="ctr">
+                      <a:solidFill>
+                        <a:schemeClr val="bg1"/>
+                      </a:solidFill>
+                      <a:prstDash val="solid"/>
+                      <a:round/>
+                      <a:headEnd type="none" w="med" len="med"/>
+                      <a:tailEnd type="none" w="med" len="med"/>
+                    </a:lnT>
+                    <a:lnB w="12700" cap="flat" cmpd="sng" algn="ctr">
+                      <a:solidFill>
+                        <a:schemeClr val="bg1"/>
+                      </a:solidFill>
+                      <a:prstDash val="solid"/>
+                      <a:round/>
+                      <a:headEnd type="none" w="med" len="med"/>
+                      <a:tailEnd type="none" w="med" len="med"/>
+                    </a:lnB>
+                    <a:lnTlToBr w="12700" cmpd="sng">
+                      <a:noFill/>
+                      <a:prstDash val="solid"/>
+                    </a:lnTlToBr>
+                    <a:lnBlToTr w="12700" cmpd="sng">
+                      <a:noFill/>
+                      <a:prstDash val="solid"/>
+                    </a:lnBlToTr>
+                  </a:tcPr>
+                </a:tc>
+              </a:tr>
+              <a:tr h="321161">
+                <a:tc>
+                  <a:txBody>
+                    <a:bodyPr/>
+                    <a:lstStyle/>
+                    <a:p>
+                      <a:r>
+                        <a:rPr lang="en-US" sz="1000" b="0" dirty="0" smtClean="0">
+                          <a:solidFill>
+                            <a:schemeClr val="bg1"/>
+                          </a:solidFill>
+                        </a:rPr>
+                        <a:t>Four</a:t>
+                      </a:r>
+                      <a:r>
+                        <a:rPr lang="en-US" sz="1000" b="0" baseline="0" dirty="0" smtClean="0">
+                          <a:solidFill>
+                            <a:schemeClr val="bg1"/>
+                          </a:solidFill>
+                        </a:rPr>
+                        <a:t> class fields (for the 4 pieces of info separated by semicolons)</a:t>
+                      </a:r>
+                      <a:endParaRPr lang="en-US" sz="1000" b="0" dirty="0">
+                        <a:solidFill>
+                          <a:schemeClr val="bg1"/>
+                        </a:solidFill>
+                      </a:endParaRPr>
+                    </a:p>
+                  </a:txBody>
+                  <a:tcPr>
+                    <a:lnL w="12700" cap="flat" cmpd="sng" algn="ctr">
+                      <a:solidFill>
+                        <a:schemeClr val="bg1"/>
+                      </a:solidFill>
+                      <a:prstDash val="solid"/>
+                      <a:round/>
+                      <a:headEnd type="none" w="med" len="med"/>
+                      <a:tailEnd type="none" w="med" len="med"/>
+                    </a:lnL>
+                    <a:lnR w="12700" cap="flat" cmpd="sng" algn="ctr">
+                      <a:solidFill>
+                        <a:schemeClr val="bg1"/>
+                      </a:solidFill>
+                      <a:prstDash val="solid"/>
+                      <a:round/>
+                      <a:headEnd type="none" w="med" len="med"/>
+                      <a:tailEnd type="none" w="med" len="med"/>
+                    </a:lnR>
+                    <a:lnT w="12700" cap="flat" cmpd="sng" algn="ctr">
+                      <a:solidFill>
+                        <a:schemeClr val="bg1"/>
+                      </a:solidFill>
+                      <a:prstDash val="solid"/>
+                      <a:round/>
+                      <a:headEnd type="none" w="med" len="med"/>
+                      <a:tailEnd type="none" w="med" len="med"/>
+                    </a:lnT>
+                    <a:lnB w="12700" cap="flat" cmpd="sng" algn="ctr">
+                      <a:solidFill>
+                        <a:schemeClr val="bg1"/>
+                      </a:solidFill>
+                      <a:prstDash val="solid"/>
+                      <a:round/>
+                      <a:headEnd type="none" w="med" len="med"/>
+                      <a:tailEnd type="none" w="med" len="med"/>
+                    </a:lnB>
+                    <a:lnTlToBr w="12700" cmpd="sng">
+                      <a:noFill/>
+                      <a:prstDash val="solid"/>
+                    </a:lnTlToBr>
+                    <a:lnBlToTr w="12700" cmpd="sng">
+                      <a:noFill/>
+                      <a:prstDash val="solid"/>
+                    </a:lnBlToTr>
+                  </a:tcPr>
+                </a:tc>
+              </a:tr>
+            </a:tbl>
+          </a:graphicData>
+        </a:graphic>
+      </p:graphicFrame>
+    </p:spTree>
+    <p:extLst>
+      <p:ext uri="{BB962C8B-B14F-4D97-AF65-F5344CB8AC3E}">
+        <p14:creationId xmlns:p14="http://schemas.microsoft.com/office/powerpoint/2010/main" val="1694514687"/>
+      </p:ext>
+    </p:extLst>
+  </p:cSld>
+  <p:clrMapOvr>
+    <a:masterClrMapping/>
+  </p:clrMapOvr>
+  <p:timing>
+    <p:tnLst>
+      <p:par>
+        <p:cTn id="1" dur="indefinite" restart="never" nodeType="tmRoot"/>
+      </p:par>
+    </p:tnLst>
+  </p:timing>
 </p:sld>
 </file>
 

</xml_diff>